<commit_message>
Deploying to gh-pages from @ sean4andrew/safuncs@aef3ae21f50cc14237a8713b4437556f4dfa3ccc 🚀
</commit_message>
<xml_diff>
--- a/reference/QCATC777-Survival-Curve.pptx
+++ b/reference/QCATC777-Survival-Curve.pptx
@@ -2334,7 +2334,7 @@
           <p:spPr>
             <a:xfrm>
               <a:off x="1531823" y="983989"/>
-              <a:ext cx="4130307" cy="3185376"/>
+              <a:ext cx="3739707" cy="3185376"/>
             </a:xfrm>
             <a:prstGeom prst="rect">
               <a:avLst/>
@@ -2360,20 +2360,20 @@
           <p:spPr>
             <a:xfrm>
               <a:off x="1531823" y="4169365"/>
-              <a:ext cx="4130307" cy="0"/>
+              <a:ext cx="3739707" cy="0"/>
             </a:xfrm>
             <a:custGeom>
               <a:avLst/>
               <a:pathLst>
-                <a:path w="4130307" h="0">
+                <a:path w="3739707" h="0">
                   <a:moveTo>
                     <a:pt x="0" y="0"/>
                   </a:moveTo>
                   <a:lnTo>
-                    <a:pt x="4130307" y="0"/>
-                  </a:lnTo>
-                  <a:lnTo>
-                    <a:pt x="4130307" y="0"/>
+                    <a:pt x="3739707" y="0"/>
+                  </a:lnTo>
+                  <a:lnTo>
+                    <a:pt x="3739707" y="0"/>
                   </a:lnTo>
                 </a:path>
               </a:pathLst>
@@ -2403,20 +2403,20 @@
           <p:spPr>
             <a:xfrm>
               <a:off x="1531823" y="3879785"/>
-              <a:ext cx="4130307" cy="0"/>
+              <a:ext cx="3739707" cy="0"/>
             </a:xfrm>
             <a:custGeom>
               <a:avLst/>
               <a:pathLst>
-                <a:path w="4130307" h="0">
+                <a:path w="3739707" h="0">
                   <a:moveTo>
                     <a:pt x="0" y="0"/>
                   </a:moveTo>
                   <a:lnTo>
-                    <a:pt x="4130307" y="0"/>
-                  </a:lnTo>
-                  <a:lnTo>
-                    <a:pt x="4130307" y="0"/>
+                    <a:pt x="3739707" y="0"/>
+                  </a:lnTo>
+                  <a:lnTo>
+                    <a:pt x="3739707" y="0"/>
                   </a:lnTo>
                 </a:path>
               </a:pathLst>
@@ -2446,20 +2446,20 @@
           <p:spPr>
             <a:xfrm>
               <a:off x="1531823" y="3590206"/>
-              <a:ext cx="4130307" cy="0"/>
+              <a:ext cx="3739707" cy="0"/>
             </a:xfrm>
             <a:custGeom>
               <a:avLst/>
               <a:pathLst>
-                <a:path w="4130307" h="0">
+                <a:path w="3739707" h="0">
                   <a:moveTo>
                     <a:pt x="0" y="0"/>
                   </a:moveTo>
                   <a:lnTo>
-                    <a:pt x="4130307" y="0"/>
-                  </a:lnTo>
-                  <a:lnTo>
-                    <a:pt x="4130307" y="0"/>
+                    <a:pt x="3739707" y="0"/>
+                  </a:lnTo>
+                  <a:lnTo>
+                    <a:pt x="3739707" y="0"/>
                   </a:lnTo>
                 </a:path>
               </a:pathLst>
@@ -2489,20 +2489,20 @@
           <p:spPr>
             <a:xfrm>
               <a:off x="1531823" y="3300626"/>
-              <a:ext cx="4130307" cy="0"/>
+              <a:ext cx="3739707" cy="0"/>
             </a:xfrm>
             <a:custGeom>
               <a:avLst/>
               <a:pathLst>
-                <a:path w="4130307" h="0">
+                <a:path w="3739707" h="0">
                   <a:moveTo>
                     <a:pt x="0" y="0"/>
                   </a:moveTo>
                   <a:lnTo>
-                    <a:pt x="4130307" y="0"/>
-                  </a:lnTo>
-                  <a:lnTo>
-                    <a:pt x="4130307" y="0"/>
+                    <a:pt x="3739707" y="0"/>
+                  </a:lnTo>
+                  <a:lnTo>
+                    <a:pt x="3739707" y="0"/>
                   </a:lnTo>
                 </a:path>
               </a:pathLst>
@@ -2532,20 +2532,20 @@
           <p:spPr>
             <a:xfrm>
               <a:off x="1531823" y="3011046"/>
-              <a:ext cx="4130307" cy="0"/>
+              <a:ext cx="3739707" cy="0"/>
             </a:xfrm>
             <a:custGeom>
               <a:avLst/>
               <a:pathLst>
-                <a:path w="4130307" h="0">
+                <a:path w="3739707" h="0">
                   <a:moveTo>
                     <a:pt x="0" y="0"/>
                   </a:moveTo>
                   <a:lnTo>
-                    <a:pt x="4130307" y="0"/>
-                  </a:lnTo>
-                  <a:lnTo>
-                    <a:pt x="4130307" y="0"/>
+                    <a:pt x="3739707" y="0"/>
+                  </a:lnTo>
+                  <a:lnTo>
+                    <a:pt x="3739707" y="0"/>
                   </a:lnTo>
                 </a:path>
               </a:pathLst>
@@ -2575,20 +2575,20 @@
           <p:spPr>
             <a:xfrm>
               <a:off x="1531823" y="2721467"/>
-              <a:ext cx="4130307" cy="0"/>
+              <a:ext cx="3739707" cy="0"/>
             </a:xfrm>
             <a:custGeom>
               <a:avLst/>
               <a:pathLst>
-                <a:path w="4130307" h="0">
+                <a:path w="3739707" h="0">
                   <a:moveTo>
                     <a:pt x="0" y="0"/>
                   </a:moveTo>
                   <a:lnTo>
-                    <a:pt x="4130307" y="0"/>
-                  </a:lnTo>
-                  <a:lnTo>
-                    <a:pt x="4130307" y="0"/>
+                    <a:pt x="3739707" y="0"/>
+                  </a:lnTo>
+                  <a:lnTo>
+                    <a:pt x="3739707" y="0"/>
                   </a:lnTo>
                 </a:path>
               </a:pathLst>
@@ -2618,20 +2618,20 @@
           <p:spPr>
             <a:xfrm>
               <a:off x="1531823" y="2431887"/>
-              <a:ext cx="4130307" cy="0"/>
+              <a:ext cx="3739707" cy="0"/>
             </a:xfrm>
             <a:custGeom>
               <a:avLst/>
               <a:pathLst>
-                <a:path w="4130307" h="0">
+                <a:path w="3739707" h="0">
                   <a:moveTo>
                     <a:pt x="0" y="0"/>
                   </a:moveTo>
                   <a:lnTo>
-                    <a:pt x="4130307" y="0"/>
-                  </a:lnTo>
-                  <a:lnTo>
-                    <a:pt x="4130307" y="0"/>
+                    <a:pt x="3739707" y="0"/>
+                  </a:lnTo>
+                  <a:lnTo>
+                    <a:pt x="3739707" y="0"/>
                   </a:lnTo>
                 </a:path>
               </a:pathLst>
@@ -2661,20 +2661,20 @@
           <p:spPr>
             <a:xfrm>
               <a:off x="1531823" y="2142307"/>
-              <a:ext cx="4130307" cy="0"/>
+              <a:ext cx="3739707" cy="0"/>
             </a:xfrm>
             <a:custGeom>
               <a:avLst/>
               <a:pathLst>
-                <a:path w="4130307" h="0">
+                <a:path w="3739707" h="0">
                   <a:moveTo>
                     <a:pt x="0" y="0"/>
                   </a:moveTo>
                   <a:lnTo>
-                    <a:pt x="4130307" y="0"/>
-                  </a:lnTo>
-                  <a:lnTo>
-                    <a:pt x="4130307" y="0"/>
+                    <a:pt x="3739707" y="0"/>
+                  </a:lnTo>
+                  <a:lnTo>
+                    <a:pt x="3739707" y="0"/>
                   </a:lnTo>
                 </a:path>
               </a:pathLst>
@@ -2704,20 +2704,20 @@
           <p:spPr>
             <a:xfrm>
               <a:off x="1531823" y="1852728"/>
-              <a:ext cx="4130307" cy="0"/>
+              <a:ext cx="3739707" cy="0"/>
             </a:xfrm>
             <a:custGeom>
               <a:avLst/>
               <a:pathLst>
-                <a:path w="4130307" h="0">
+                <a:path w="3739707" h="0">
                   <a:moveTo>
                     <a:pt x="0" y="0"/>
                   </a:moveTo>
                   <a:lnTo>
-                    <a:pt x="4130307" y="0"/>
-                  </a:lnTo>
-                  <a:lnTo>
-                    <a:pt x="4130307" y="0"/>
+                    <a:pt x="3739707" y="0"/>
+                  </a:lnTo>
+                  <a:lnTo>
+                    <a:pt x="3739707" y="0"/>
                   </a:lnTo>
                 </a:path>
               </a:pathLst>
@@ -2747,20 +2747,20 @@
           <p:spPr>
             <a:xfrm>
               <a:off x="1531823" y="1563148"/>
-              <a:ext cx="4130307" cy="0"/>
+              <a:ext cx="3739707" cy="0"/>
             </a:xfrm>
             <a:custGeom>
               <a:avLst/>
               <a:pathLst>
-                <a:path w="4130307" h="0">
+                <a:path w="3739707" h="0">
                   <a:moveTo>
                     <a:pt x="0" y="0"/>
                   </a:moveTo>
                   <a:lnTo>
-                    <a:pt x="4130307" y="0"/>
-                  </a:lnTo>
-                  <a:lnTo>
-                    <a:pt x="4130307" y="0"/>
+                    <a:pt x="3739707" y="0"/>
+                  </a:lnTo>
+                  <a:lnTo>
+                    <a:pt x="3739707" y="0"/>
                   </a:lnTo>
                 </a:path>
               </a:pathLst>
@@ -2790,20 +2790,20 @@
           <p:spPr>
             <a:xfrm>
               <a:off x="1531823" y="1273568"/>
-              <a:ext cx="4130307" cy="0"/>
+              <a:ext cx="3739707" cy="0"/>
             </a:xfrm>
             <a:custGeom>
               <a:avLst/>
               <a:pathLst>
-                <a:path w="4130307" h="0">
+                <a:path w="3739707" h="0">
                   <a:moveTo>
                     <a:pt x="0" y="0"/>
                   </a:moveTo>
                   <a:lnTo>
-                    <a:pt x="4130307" y="0"/>
-                  </a:lnTo>
-                  <a:lnTo>
-                    <a:pt x="4130307" y="0"/>
+                    <a:pt x="3739707" y="0"/>
+                  </a:lnTo>
+                  <a:lnTo>
+                    <a:pt x="3739707" y="0"/>
                   </a:lnTo>
                 </a:path>
               </a:pathLst>
@@ -2833,20 +2833,20 @@
           <p:spPr>
             <a:xfrm>
               <a:off x="1531823" y="983989"/>
-              <a:ext cx="4130307" cy="0"/>
+              <a:ext cx="3739707" cy="0"/>
             </a:xfrm>
             <a:custGeom>
               <a:avLst/>
               <a:pathLst>
-                <a:path w="4130307" h="0">
+                <a:path w="3739707" h="0">
                   <a:moveTo>
                     <a:pt x="0" y="0"/>
                   </a:moveTo>
                   <a:lnTo>
-                    <a:pt x="4130307" y="0"/>
-                  </a:lnTo>
-                  <a:lnTo>
-                    <a:pt x="4130307" y="0"/>
+                    <a:pt x="3739707" y="0"/>
+                  </a:lnTo>
+                  <a:lnTo>
+                    <a:pt x="3739707" y="0"/>
                   </a:lnTo>
                 </a:path>
               </a:pathLst>
@@ -2875,7 +2875,7 @@
           </p:nvSpPr>
           <p:spPr>
             <a:xfrm>
-              <a:off x="1580497" y="983989"/>
+              <a:off x="1531823" y="983989"/>
               <a:ext cx="0" cy="3185376"/>
             </a:xfrm>
             <a:custGeom>
@@ -2918,7 +2918,7 @@
           </p:nvSpPr>
           <p:spPr>
             <a:xfrm>
-              <a:off x="1858632" y="983989"/>
+              <a:off x="1871796" y="983989"/>
               <a:ext cx="0" cy="3185376"/>
             </a:xfrm>
             <a:custGeom>
@@ -2961,7 +2961,7 @@
           </p:nvSpPr>
           <p:spPr>
             <a:xfrm>
-              <a:off x="2136767" y="983989"/>
+              <a:off x="2211770" y="983989"/>
               <a:ext cx="0" cy="3185376"/>
             </a:xfrm>
             <a:custGeom>
@@ -3004,7 +3004,7 @@
           </p:nvSpPr>
           <p:spPr>
             <a:xfrm>
-              <a:off x="2414902" y="983989"/>
+              <a:off x="2551743" y="983989"/>
               <a:ext cx="0" cy="3185376"/>
             </a:xfrm>
             <a:custGeom>
@@ -3047,7 +3047,7 @@
           </p:nvSpPr>
           <p:spPr>
             <a:xfrm>
-              <a:off x="2693037" y="983989"/>
+              <a:off x="2891717" y="983989"/>
               <a:ext cx="0" cy="3185376"/>
             </a:xfrm>
             <a:custGeom>
@@ -3090,7 +3090,7 @@
           </p:nvSpPr>
           <p:spPr>
             <a:xfrm>
-              <a:off x="2971173" y="983989"/>
+              <a:off x="3231690" y="983989"/>
               <a:ext cx="0" cy="3185376"/>
             </a:xfrm>
             <a:custGeom>
@@ -3133,7 +3133,7 @@
           </p:nvSpPr>
           <p:spPr>
             <a:xfrm>
-              <a:off x="3249308" y="983989"/>
+              <a:off x="3571663" y="983989"/>
               <a:ext cx="0" cy="3185376"/>
             </a:xfrm>
             <a:custGeom>
@@ -3176,7 +3176,7 @@
           </p:nvSpPr>
           <p:spPr>
             <a:xfrm>
-              <a:off x="3527443" y="983989"/>
+              <a:off x="3911637" y="983989"/>
               <a:ext cx="0" cy="3185376"/>
             </a:xfrm>
             <a:custGeom>
@@ -3219,7 +3219,7 @@
           </p:nvSpPr>
           <p:spPr>
             <a:xfrm>
-              <a:off x="3805578" y="983989"/>
+              <a:off x="4251610" y="983989"/>
               <a:ext cx="0" cy="3185376"/>
             </a:xfrm>
             <a:custGeom>
@@ -3262,7 +3262,7 @@
           </p:nvSpPr>
           <p:spPr>
             <a:xfrm>
-              <a:off x="4083714" y="983989"/>
+              <a:off x="4591584" y="983989"/>
               <a:ext cx="0" cy="3185376"/>
             </a:xfrm>
             <a:custGeom>
@@ -3305,7 +3305,7 @@
           </p:nvSpPr>
           <p:spPr>
             <a:xfrm>
-              <a:off x="4361849" y="983989"/>
+              <a:off x="4931557" y="983989"/>
               <a:ext cx="0" cy="3185376"/>
             </a:xfrm>
             <a:custGeom>
@@ -3348,7 +3348,7 @@
           </p:nvSpPr>
           <p:spPr>
             <a:xfrm>
-              <a:off x="4639984" y="983989"/>
+              <a:off x="5271530" y="983989"/>
               <a:ext cx="0" cy="3185376"/>
             </a:xfrm>
             <a:custGeom>
@@ -3391,193 +3391,21 @@
           </p:nvSpPr>
           <p:spPr>
             <a:xfrm>
-              <a:off x="4918119" y="983989"/>
-              <a:ext cx="0" cy="3185376"/>
+              <a:off x="1531823" y="4024575"/>
+              <a:ext cx="3739707" cy="0"/>
             </a:xfrm>
             <a:custGeom>
               <a:avLst/>
               <a:pathLst>
-                <a:path w="0" h="3185376">
+                <a:path w="3739707" h="0">
                   <a:moveTo>
-                    <a:pt x="0" y="3185376"/>
+                    <a:pt x="0" y="0"/>
                   </a:moveTo>
                   <a:lnTo>
-                    <a:pt x="0" y="0"/>
-                  </a:lnTo>
-                  <a:lnTo>
-                    <a:pt x="0" y="0"/>
-                  </a:lnTo>
-                </a:path>
-              </a:pathLst>
-            </a:custGeom>
-            <a:ln w="6775" cap="flat">
-              <a:solidFill>
-                <a:srgbClr val="FFFFFF">
-                  <a:alpha val="100000"/>
-                </a:srgbClr>
-              </a:solidFill>
-              <a:prstDash val="solid"/>
-              <a:round/>
-            </a:ln>
-          </p:spPr>
-          <p:txBody>
-            <a:bodyPr/>
-            <a:lstStyle/>
-            <a:p/>
-          </p:txBody>
-        </p:sp>
-        <p:sp>
-          <p:nvSpPr>
-            <p:cNvPr id="32" name="pl31"/>
-            <p:cNvSpPr/>
-            <p:nvPr/>
-          </p:nvSpPr>
-          <p:spPr>
-            <a:xfrm>
-              <a:off x="5196254" y="983989"/>
-              <a:ext cx="0" cy="3185376"/>
-            </a:xfrm>
-            <a:custGeom>
-              <a:avLst/>
-              <a:pathLst>
-                <a:path w="0" h="3185376">
-                  <a:moveTo>
-                    <a:pt x="0" y="3185376"/>
-                  </a:moveTo>
-                  <a:lnTo>
-                    <a:pt x="0" y="0"/>
-                  </a:lnTo>
-                  <a:lnTo>
-                    <a:pt x="0" y="0"/>
-                  </a:lnTo>
-                </a:path>
-              </a:pathLst>
-            </a:custGeom>
-            <a:ln w="6775" cap="flat">
-              <a:solidFill>
-                <a:srgbClr val="FFFFFF">
-                  <a:alpha val="100000"/>
-                </a:srgbClr>
-              </a:solidFill>
-              <a:prstDash val="solid"/>
-              <a:round/>
-            </a:ln>
-          </p:spPr>
-          <p:txBody>
-            <a:bodyPr/>
-            <a:lstStyle/>
-            <a:p/>
-          </p:txBody>
-        </p:sp>
-        <p:sp>
-          <p:nvSpPr>
-            <p:cNvPr id="33" name="pl32"/>
-            <p:cNvSpPr/>
-            <p:nvPr/>
-          </p:nvSpPr>
-          <p:spPr>
-            <a:xfrm>
-              <a:off x="5474390" y="983989"/>
-              <a:ext cx="0" cy="3185376"/>
-            </a:xfrm>
-            <a:custGeom>
-              <a:avLst/>
-              <a:pathLst>
-                <a:path w="0" h="3185376">
-                  <a:moveTo>
-                    <a:pt x="0" y="3185376"/>
-                  </a:moveTo>
-                  <a:lnTo>
-                    <a:pt x="0" y="0"/>
-                  </a:lnTo>
-                  <a:lnTo>
-                    <a:pt x="0" y="0"/>
-                  </a:lnTo>
-                </a:path>
-              </a:pathLst>
-            </a:custGeom>
-            <a:ln w="6775" cap="flat">
-              <a:solidFill>
-                <a:srgbClr val="FFFFFF">
-                  <a:alpha val="100000"/>
-                </a:srgbClr>
-              </a:solidFill>
-              <a:prstDash val="solid"/>
-              <a:round/>
-            </a:ln>
-          </p:spPr>
-          <p:txBody>
-            <a:bodyPr/>
-            <a:lstStyle/>
-            <a:p/>
-          </p:txBody>
-        </p:sp>
-        <p:sp>
-          <p:nvSpPr>
-            <p:cNvPr id="34" name="pl33"/>
-            <p:cNvSpPr/>
-            <p:nvPr/>
-          </p:nvSpPr>
-          <p:spPr>
-            <a:xfrm>
-              <a:off x="5613457" y="983989"/>
-              <a:ext cx="0" cy="3185376"/>
-            </a:xfrm>
-            <a:custGeom>
-              <a:avLst/>
-              <a:pathLst>
-                <a:path w="0" h="3185376">
-                  <a:moveTo>
-                    <a:pt x="0" y="3185376"/>
-                  </a:moveTo>
-                  <a:lnTo>
-                    <a:pt x="0" y="0"/>
-                  </a:lnTo>
-                  <a:lnTo>
-                    <a:pt x="0" y="0"/>
-                  </a:lnTo>
-                </a:path>
-              </a:pathLst>
-            </a:custGeom>
-            <a:ln w="6775" cap="flat">
-              <a:solidFill>
-                <a:srgbClr val="FFFFFF">
-                  <a:alpha val="100000"/>
-                </a:srgbClr>
-              </a:solidFill>
-              <a:prstDash val="solid"/>
-              <a:round/>
-            </a:ln>
-          </p:spPr>
-          <p:txBody>
-            <a:bodyPr/>
-            <a:lstStyle/>
-            <a:p/>
-          </p:txBody>
-        </p:sp>
-        <p:sp>
-          <p:nvSpPr>
-            <p:cNvPr id="35" name="pl34"/>
-            <p:cNvSpPr/>
-            <p:nvPr/>
-          </p:nvSpPr>
-          <p:spPr>
-            <a:xfrm>
-              <a:off x="1531823" y="4024575"/>
-              <a:ext cx="4130307" cy="0"/>
-            </a:xfrm>
-            <a:custGeom>
-              <a:avLst/>
-              <a:pathLst>
-                <a:path w="4130307" h="0">
-                  <a:moveTo>
-                    <a:pt x="0" y="0"/>
-                  </a:moveTo>
-                  <a:lnTo>
-                    <a:pt x="4130307" y="0"/>
-                  </a:lnTo>
-                  <a:lnTo>
-                    <a:pt x="4130307" y="0"/>
+                    <a:pt x="3739707" y="0"/>
+                  </a:lnTo>
+                  <a:lnTo>
+                    <a:pt x="3739707" y="0"/>
                   </a:lnTo>
                 </a:path>
               </a:pathLst>
@@ -3600,27 +3428,27 @@
         </p:sp>
         <p:sp>
           <p:nvSpPr>
-            <p:cNvPr id="36" name="pl35"/>
+            <p:cNvPr id="32" name="pl31"/>
             <p:cNvSpPr/>
             <p:nvPr/>
           </p:nvSpPr>
           <p:spPr>
             <a:xfrm>
               <a:off x="1531823" y="3734995"/>
-              <a:ext cx="4130307" cy="0"/>
+              <a:ext cx="3739707" cy="0"/>
             </a:xfrm>
             <a:custGeom>
               <a:avLst/>
               <a:pathLst>
-                <a:path w="4130307" h="0">
+                <a:path w="3739707" h="0">
                   <a:moveTo>
                     <a:pt x="0" y="0"/>
                   </a:moveTo>
                   <a:lnTo>
-                    <a:pt x="4130307" y="0"/>
-                  </a:lnTo>
-                  <a:lnTo>
-                    <a:pt x="4130307" y="0"/>
+                    <a:pt x="3739707" y="0"/>
+                  </a:lnTo>
+                  <a:lnTo>
+                    <a:pt x="3739707" y="0"/>
                   </a:lnTo>
                 </a:path>
               </a:pathLst>
@@ -3643,27 +3471,27 @@
         </p:sp>
         <p:sp>
           <p:nvSpPr>
-            <p:cNvPr id="37" name="pl36"/>
+            <p:cNvPr id="33" name="pl32"/>
             <p:cNvSpPr/>
             <p:nvPr/>
           </p:nvSpPr>
           <p:spPr>
             <a:xfrm>
               <a:off x="1531823" y="3445416"/>
-              <a:ext cx="4130307" cy="0"/>
+              <a:ext cx="3739707" cy="0"/>
             </a:xfrm>
             <a:custGeom>
               <a:avLst/>
               <a:pathLst>
-                <a:path w="4130307" h="0">
+                <a:path w="3739707" h="0">
                   <a:moveTo>
                     <a:pt x="0" y="0"/>
                   </a:moveTo>
                   <a:lnTo>
-                    <a:pt x="4130307" y="0"/>
-                  </a:lnTo>
-                  <a:lnTo>
-                    <a:pt x="4130307" y="0"/>
+                    <a:pt x="3739707" y="0"/>
+                  </a:lnTo>
+                  <a:lnTo>
+                    <a:pt x="3739707" y="0"/>
                   </a:lnTo>
                 </a:path>
               </a:pathLst>
@@ -3686,27 +3514,27 @@
         </p:sp>
         <p:sp>
           <p:nvSpPr>
-            <p:cNvPr id="38" name="pl37"/>
+            <p:cNvPr id="34" name="pl33"/>
             <p:cNvSpPr/>
             <p:nvPr/>
           </p:nvSpPr>
           <p:spPr>
             <a:xfrm>
               <a:off x="1531823" y="3155836"/>
-              <a:ext cx="4130307" cy="0"/>
+              <a:ext cx="3739707" cy="0"/>
             </a:xfrm>
             <a:custGeom>
               <a:avLst/>
               <a:pathLst>
-                <a:path w="4130307" h="0">
+                <a:path w="3739707" h="0">
                   <a:moveTo>
                     <a:pt x="0" y="0"/>
                   </a:moveTo>
                   <a:lnTo>
-                    <a:pt x="4130307" y="0"/>
-                  </a:lnTo>
-                  <a:lnTo>
-                    <a:pt x="4130307" y="0"/>
+                    <a:pt x="3739707" y="0"/>
+                  </a:lnTo>
+                  <a:lnTo>
+                    <a:pt x="3739707" y="0"/>
                   </a:lnTo>
                 </a:path>
               </a:pathLst>
@@ -3729,27 +3557,27 @@
         </p:sp>
         <p:sp>
           <p:nvSpPr>
-            <p:cNvPr id="39" name="pl38"/>
+            <p:cNvPr id="35" name="pl34"/>
             <p:cNvSpPr/>
             <p:nvPr/>
           </p:nvSpPr>
           <p:spPr>
             <a:xfrm>
               <a:off x="1531823" y="2866256"/>
-              <a:ext cx="4130307" cy="0"/>
+              <a:ext cx="3739707" cy="0"/>
             </a:xfrm>
             <a:custGeom>
               <a:avLst/>
               <a:pathLst>
-                <a:path w="4130307" h="0">
+                <a:path w="3739707" h="0">
                   <a:moveTo>
                     <a:pt x="0" y="0"/>
                   </a:moveTo>
                   <a:lnTo>
-                    <a:pt x="4130307" y="0"/>
-                  </a:lnTo>
-                  <a:lnTo>
-                    <a:pt x="4130307" y="0"/>
+                    <a:pt x="3739707" y="0"/>
+                  </a:lnTo>
+                  <a:lnTo>
+                    <a:pt x="3739707" y="0"/>
                   </a:lnTo>
                 </a:path>
               </a:pathLst>
@@ -3772,27 +3600,27 @@
         </p:sp>
         <p:sp>
           <p:nvSpPr>
-            <p:cNvPr id="40" name="pl39"/>
+            <p:cNvPr id="36" name="pl35"/>
             <p:cNvSpPr/>
             <p:nvPr/>
           </p:nvSpPr>
           <p:spPr>
             <a:xfrm>
               <a:off x="1531823" y="2576677"/>
-              <a:ext cx="4130307" cy="0"/>
+              <a:ext cx="3739707" cy="0"/>
             </a:xfrm>
             <a:custGeom>
               <a:avLst/>
               <a:pathLst>
-                <a:path w="4130307" h="0">
+                <a:path w="3739707" h="0">
                   <a:moveTo>
                     <a:pt x="0" y="0"/>
                   </a:moveTo>
                   <a:lnTo>
-                    <a:pt x="4130307" y="0"/>
-                  </a:lnTo>
-                  <a:lnTo>
-                    <a:pt x="4130307" y="0"/>
+                    <a:pt x="3739707" y="0"/>
+                  </a:lnTo>
+                  <a:lnTo>
+                    <a:pt x="3739707" y="0"/>
                   </a:lnTo>
                 </a:path>
               </a:pathLst>
@@ -3815,27 +3643,27 @@
         </p:sp>
         <p:sp>
           <p:nvSpPr>
-            <p:cNvPr id="41" name="pl40"/>
+            <p:cNvPr id="37" name="pl36"/>
             <p:cNvSpPr/>
             <p:nvPr/>
           </p:nvSpPr>
           <p:spPr>
             <a:xfrm>
               <a:off x="1531823" y="2287097"/>
-              <a:ext cx="4130307" cy="0"/>
+              <a:ext cx="3739707" cy="0"/>
             </a:xfrm>
             <a:custGeom>
               <a:avLst/>
               <a:pathLst>
-                <a:path w="4130307" h="0">
+                <a:path w="3739707" h="0">
                   <a:moveTo>
                     <a:pt x="0" y="0"/>
                   </a:moveTo>
                   <a:lnTo>
-                    <a:pt x="4130307" y="0"/>
-                  </a:lnTo>
-                  <a:lnTo>
-                    <a:pt x="4130307" y="0"/>
+                    <a:pt x="3739707" y="0"/>
+                  </a:lnTo>
+                  <a:lnTo>
+                    <a:pt x="3739707" y="0"/>
                   </a:lnTo>
                 </a:path>
               </a:pathLst>
@@ -3858,27 +3686,27 @@
         </p:sp>
         <p:sp>
           <p:nvSpPr>
-            <p:cNvPr id="42" name="pl41"/>
+            <p:cNvPr id="38" name="pl37"/>
             <p:cNvSpPr/>
             <p:nvPr/>
           </p:nvSpPr>
           <p:spPr>
             <a:xfrm>
               <a:off x="1531823" y="1997517"/>
-              <a:ext cx="4130307" cy="0"/>
+              <a:ext cx="3739707" cy="0"/>
             </a:xfrm>
             <a:custGeom>
               <a:avLst/>
               <a:pathLst>
-                <a:path w="4130307" h="0">
+                <a:path w="3739707" h="0">
                   <a:moveTo>
                     <a:pt x="0" y="0"/>
                   </a:moveTo>
                   <a:lnTo>
-                    <a:pt x="4130307" y="0"/>
-                  </a:lnTo>
-                  <a:lnTo>
-                    <a:pt x="4130307" y="0"/>
+                    <a:pt x="3739707" y="0"/>
+                  </a:lnTo>
+                  <a:lnTo>
+                    <a:pt x="3739707" y="0"/>
                   </a:lnTo>
                 </a:path>
               </a:pathLst>
@@ -3901,27 +3729,27 @@
         </p:sp>
         <p:sp>
           <p:nvSpPr>
-            <p:cNvPr id="43" name="pl42"/>
+            <p:cNvPr id="39" name="pl38"/>
             <p:cNvSpPr/>
             <p:nvPr/>
           </p:nvSpPr>
           <p:spPr>
             <a:xfrm>
               <a:off x="1531823" y="1707938"/>
-              <a:ext cx="4130307" cy="0"/>
+              <a:ext cx="3739707" cy="0"/>
             </a:xfrm>
             <a:custGeom>
               <a:avLst/>
               <a:pathLst>
-                <a:path w="4130307" h="0">
+                <a:path w="3739707" h="0">
                   <a:moveTo>
                     <a:pt x="0" y="0"/>
                   </a:moveTo>
                   <a:lnTo>
-                    <a:pt x="4130307" y="0"/>
-                  </a:lnTo>
-                  <a:lnTo>
-                    <a:pt x="4130307" y="0"/>
+                    <a:pt x="3739707" y="0"/>
+                  </a:lnTo>
+                  <a:lnTo>
+                    <a:pt x="3739707" y="0"/>
                   </a:lnTo>
                 </a:path>
               </a:pathLst>
@@ -3944,27 +3772,27 @@
         </p:sp>
         <p:sp>
           <p:nvSpPr>
-            <p:cNvPr id="44" name="pl43"/>
+            <p:cNvPr id="40" name="pl39"/>
             <p:cNvSpPr/>
             <p:nvPr/>
           </p:nvSpPr>
           <p:spPr>
             <a:xfrm>
               <a:off x="1531823" y="1418358"/>
-              <a:ext cx="4130307" cy="0"/>
+              <a:ext cx="3739707" cy="0"/>
             </a:xfrm>
             <a:custGeom>
               <a:avLst/>
               <a:pathLst>
-                <a:path w="4130307" h="0">
+                <a:path w="3739707" h="0">
                   <a:moveTo>
                     <a:pt x="0" y="0"/>
                   </a:moveTo>
                   <a:lnTo>
-                    <a:pt x="4130307" y="0"/>
-                  </a:lnTo>
-                  <a:lnTo>
-                    <a:pt x="4130307" y="0"/>
+                    <a:pt x="3739707" y="0"/>
+                  </a:lnTo>
+                  <a:lnTo>
+                    <a:pt x="3739707" y="0"/>
                   </a:lnTo>
                 </a:path>
               </a:pathLst>
@@ -3987,27 +3815,27 @@
         </p:sp>
         <p:sp>
           <p:nvSpPr>
-            <p:cNvPr id="45" name="pl44"/>
+            <p:cNvPr id="41" name="pl40"/>
             <p:cNvSpPr/>
             <p:nvPr/>
           </p:nvSpPr>
           <p:spPr>
             <a:xfrm>
               <a:off x="1531823" y="1128778"/>
-              <a:ext cx="4130307" cy="0"/>
+              <a:ext cx="3739707" cy="0"/>
             </a:xfrm>
             <a:custGeom>
               <a:avLst/>
               <a:pathLst>
-                <a:path w="4130307" h="0">
+                <a:path w="3739707" h="0">
                   <a:moveTo>
                     <a:pt x="0" y="0"/>
                   </a:moveTo>
                   <a:lnTo>
-                    <a:pt x="4130307" y="0"/>
-                  </a:lnTo>
-                  <a:lnTo>
-                    <a:pt x="4130307" y="0"/>
+                    <a:pt x="3739707" y="0"/>
+                  </a:lnTo>
+                  <a:lnTo>
+                    <a:pt x="3739707" y="0"/>
                   </a:lnTo>
                 </a:path>
               </a:pathLst>
@@ -4030,13 +3858,13 @@
         </p:sp>
         <p:sp>
           <p:nvSpPr>
-            <p:cNvPr id="46" name="pl45"/>
-            <p:cNvSpPr/>
-            <p:nvPr/>
-          </p:nvSpPr>
-          <p:spPr>
-            <a:xfrm>
-              <a:off x="1719564" y="983989"/>
+            <p:cNvPr id="42" name="pl41"/>
+            <p:cNvSpPr/>
+            <p:nvPr/>
+          </p:nvSpPr>
+          <p:spPr>
+            <a:xfrm>
+              <a:off x="1701810" y="983989"/>
               <a:ext cx="0" cy="3185376"/>
             </a:xfrm>
             <a:custGeom>
@@ -4073,13 +3901,13 @@
         </p:sp>
         <p:sp>
           <p:nvSpPr>
-            <p:cNvPr id="47" name="pl46"/>
-            <p:cNvSpPr/>
-            <p:nvPr/>
-          </p:nvSpPr>
-          <p:spPr>
-            <a:xfrm>
-              <a:off x="1997699" y="983989"/>
+            <p:cNvPr id="43" name="pl42"/>
+            <p:cNvSpPr/>
+            <p:nvPr/>
+          </p:nvSpPr>
+          <p:spPr>
+            <a:xfrm>
+              <a:off x="2041783" y="983989"/>
               <a:ext cx="0" cy="3185376"/>
             </a:xfrm>
             <a:custGeom>
@@ -4116,13 +3944,13 @@
         </p:sp>
         <p:sp>
           <p:nvSpPr>
-            <p:cNvPr id="48" name="pl47"/>
-            <p:cNvSpPr/>
-            <p:nvPr/>
-          </p:nvSpPr>
-          <p:spPr>
-            <a:xfrm>
-              <a:off x="2275835" y="983989"/>
+            <p:cNvPr id="44" name="pl43"/>
+            <p:cNvSpPr/>
+            <p:nvPr/>
+          </p:nvSpPr>
+          <p:spPr>
+            <a:xfrm>
+              <a:off x="2381756" y="983989"/>
               <a:ext cx="0" cy="3185376"/>
             </a:xfrm>
             <a:custGeom>
@@ -4159,13 +3987,13 @@
         </p:sp>
         <p:sp>
           <p:nvSpPr>
-            <p:cNvPr id="49" name="pl48"/>
-            <p:cNvSpPr/>
-            <p:nvPr/>
-          </p:nvSpPr>
-          <p:spPr>
-            <a:xfrm>
-              <a:off x="2553970" y="983989"/>
+            <p:cNvPr id="45" name="pl44"/>
+            <p:cNvSpPr/>
+            <p:nvPr/>
+          </p:nvSpPr>
+          <p:spPr>
+            <a:xfrm>
+              <a:off x="2721730" y="983989"/>
               <a:ext cx="0" cy="3185376"/>
             </a:xfrm>
             <a:custGeom>
@@ -4202,13 +4030,13 @@
         </p:sp>
         <p:sp>
           <p:nvSpPr>
-            <p:cNvPr id="50" name="pl49"/>
-            <p:cNvSpPr/>
-            <p:nvPr/>
-          </p:nvSpPr>
-          <p:spPr>
-            <a:xfrm>
-              <a:off x="2832105" y="983989"/>
+            <p:cNvPr id="46" name="pl45"/>
+            <p:cNvSpPr/>
+            <p:nvPr/>
+          </p:nvSpPr>
+          <p:spPr>
+            <a:xfrm>
+              <a:off x="3061703" y="983989"/>
               <a:ext cx="0" cy="3185376"/>
             </a:xfrm>
             <a:custGeom>
@@ -4245,13 +4073,13 @@
         </p:sp>
         <p:sp>
           <p:nvSpPr>
-            <p:cNvPr id="51" name="pl50"/>
-            <p:cNvSpPr/>
-            <p:nvPr/>
-          </p:nvSpPr>
-          <p:spPr>
-            <a:xfrm>
-              <a:off x="3110240" y="983989"/>
+            <p:cNvPr id="47" name="pl46"/>
+            <p:cNvSpPr/>
+            <p:nvPr/>
+          </p:nvSpPr>
+          <p:spPr>
+            <a:xfrm>
+              <a:off x="3401677" y="983989"/>
               <a:ext cx="0" cy="3185376"/>
             </a:xfrm>
             <a:custGeom>
@@ -4288,13 +4116,13 @@
         </p:sp>
         <p:sp>
           <p:nvSpPr>
-            <p:cNvPr id="52" name="pl51"/>
-            <p:cNvSpPr/>
-            <p:nvPr/>
-          </p:nvSpPr>
-          <p:spPr>
-            <a:xfrm>
-              <a:off x="3388375" y="983989"/>
+            <p:cNvPr id="48" name="pl47"/>
+            <p:cNvSpPr/>
+            <p:nvPr/>
+          </p:nvSpPr>
+          <p:spPr>
+            <a:xfrm>
+              <a:off x="3741650" y="983989"/>
               <a:ext cx="0" cy="3185376"/>
             </a:xfrm>
             <a:custGeom>
@@ -4331,13 +4159,13 @@
         </p:sp>
         <p:sp>
           <p:nvSpPr>
-            <p:cNvPr id="53" name="pl52"/>
-            <p:cNvSpPr/>
-            <p:nvPr/>
-          </p:nvSpPr>
-          <p:spPr>
-            <a:xfrm>
-              <a:off x="3666511" y="983989"/>
+            <p:cNvPr id="49" name="pl48"/>
+            <p:cNvSpPr/>
+            <p:nvPr/>
+          </p:nvSpPr>
+          <p:spPr>
+            <a:xfrm>
+              <a:off x="4081624" y="983989"/>
               <a:ext cx="0" cy="3185376"/>
             </a:xfrm>
             <a:custGeom>
@@ -4374,13 +4202,13 @@
         </p:sp>
         <p:sp>
           <p:nvSpPr>
-            <p:cNvPr id="54" name="pl53"/>
-            <p:cNvSpPr/>
-            <p:nvPr/>
-          </p:nvSpPr>
-          <p:spPr>
-            <a:xfrm>
-              <a:off x="3944646" y="983989"/>
+            <p:cNvPr id="50" name="pl49"/>
+            <p:cNvSpPr/>
+            <p:nvPr/>
+          </p:nvSpPr>
+          <p:spPr>
+            <a:xfrm>
+              <a:off x="4421597" y="983989"/>
               <a:ext cx="0" cy="3185376"/>
             </a:xfrm>
             <a:custGeom>
@@ -4417,13 +4245,13 @@
         </p:sp>
         <p:sp>
           <p:nvSpPr>
-            <p:cNvPr id="55" name="pl54"/>
-            <p:cNvSpPr/>
-            <p:nvPr/>
-          </p:nvSpPr>
-          <p:spPr>
-            <a:xfrm>
-              <a:off x="4222781" y="983989"/>
+            <p:cNvPr id="51" name="pl50"/>
+            <p:cNvSpPr/>
+            <p:nvPr/>
+          </p:nvSpPr>
+          <p:spPr>
+            <a:xfrm>
+              <a:off x="4761570" y="983989"/>
               <a:ext cx="0" cy="3185376"/>
             </a:xfrm>
             <a:custGeom>
@@ -4460,13 +4288,13 @@
         </p:sp>
         <p:sp>
           <p:nvSpPr>
-            <p:cNvPr id="56" name="pl55"/>
-            <p:cNvSpPr/>
-            <p:nvPr/>
-          </p:nvSpPr>
-          <p:spPr>
-            <a:xfrm>
-              <a:off x="4500916" y="983989"/>
+            <p:cNvPr id="52" name="pl51"/>
+            <p:cNvSpPr/>
+            <p:nvPr/>
+          </p:nvSpPr>
+          <p:spPr>
+            <a:xfrm>
+              <a:off x="5101544" y="983989"/>
               <a:ext cx="0" cy="3185376"/>
             </a:xfrm>
             <a:custGeom>
@@ -4503,300 +4331,168 @@
         </p:sp>
         <p:sp>
           <p:nvSpPr>
-            <p:cNvPr id="57" name="pl56"/>
-            <p:cNvSpPr/>
-            <p:nvPr/>
-          </p:nvSpPr>
-          <p:spPr>
-            <a:xfrm>
-              <a:off x="4779052" y="983989"/>
-              <a:ext cx="0" cy="3185376"/>
+            <p:cNvPr id="53" name="pl52"/>
+            <p:cNvSpPr/>
+            <p:nvPr/>
+          </p:nvSpPr>
+          <p:spPr>
+            <a:xfrm>
+              <a:off x="1701810" y="1128778"/>
+              <a:ext cx="3569720" cy="1023181"/>
             </a:xfrm>
             <a:custGeom>
               <a:avLst/>
               <a:pathLst>
-                <a:path w="0" h="3185376">
+                <a:path w="3569720" h="1023181">
                   <a:moveTo>
-                    <a:pt x="0" y="3185376"/>
+                    <a:pt x="0" y="0"/>
                   </a:moveTo>
                   <a:lnTo>
-                    <a:pt x="0" y="0"/>
-                  </a:lnTo>
-                  <a:lnTo>
-                    <a:pt x="0" y="0"/>
-                  </a:lnTo>
-                </a:path>
-              </a:pathLst>
-            </a:custGeom>
-            <a:ln w="13550" cap="flat">
-              <a:solidFill>
-                <a:srgbClr val="FFFFFF">
-                  <a:alpha val="100000"/>
-                </a:srgbClr>
-              </a:solidFill>
-              <a:prstDash val="solid"/>
-              <a:round/>
-            </a:ln>
-          </p:spPr>
-          <p:txBody>
-            <a:bodyPr/>
-            <a:lstStyle/>
-            <a:p/>
-          </p:txBody>
-        </p:sp>
-        <p:sp>
-          <p:nvSpPr>
-            <p:cNvPr id="58" name="pl57"/>
-            <p:cNvSpPr/>
-            <p:nvPr/>
-          </p:nvSpPr>
-          <p:spPr>
-            <a:xfrm>
-              <a:off x="5057187" y="983989"/>
-              <a:ext cx="0" cy="3185376"/>
-            </a:xfrm>
-            <a:custGeom>
-              <a:avLst/>
-              <a:pathLst>
-                <a:path w="0" h="3185376">
-                  <a:moveTo>
-                    <a:pt x="0" y="3185376"/>
-                  </a:moveTo>
-                  <a:lnTo>
-                    <a:pt x="0" y="0"/>
-                  </a:lnTo>
-                  <a:lnTo>
-                    <a:pt x="0" y="0"/>
-                  </a:lnTo>
-                </a:path>
-              </a:pathLst>
-            </a:custGeom>
-            <a:ln w="13550" cap="flat">
-              <a:solidFill>
-                <a:srgbClr val="FFFFFF">
-                  <a:alpha val="100000"/>
-                </a:srgbClr>
-              </a:solidFill>
-              <a:prstDash val="solid"/>
-              <a:round/>
-            </a:ln>
-          </p:spPr>
-          <p:txBody>
-            <a:bodyPr/>
-            <a:lstStyle/>
-            <a:p/>
-          </p:txBody>
-        </p:sp>
-        <p:sp>
-          <p:nvSpPr>
-            <p:cNvPr id="59" name="pl58"/>
-            <p:cNvSpPr/>
-            <p:nvPr/>
-          </p:nvSpPr>
-          <p:spPr>
-            <a:xfrm>
-              <a:off x="5335322" y="983989"/>
-              <a:ext cx="0" cy="3185376"/>
-            </a:xfrm>
-            <a:custGeom>
-              <a:avLst/>
-              <a:pathLst>
-                <a:path w="0" h="3185376">
-                  <a:moveTo>
-                    <a:pt x="0" y="3185376"/>
-                  </a:moveTo>
-                  <a:lnTo>
-                    <a:pt x="0" y="0"/>
-                  </a:lnTo>
-                  <a:lnTo>
-                    <a:pt x="0" y="0"/>
-                  </a:lnTo>
-                </a:path>
-              </a:pathLst>
-            </a:custGeom>
-            <a:ln w="13550" cap="flat">
-              <a:solidFill>
-                <a:srgbClr val="FFFFFF">
-                  <a:alpha val="100000"/>
-                </a:srgbClr>
-              </a:solidFill>
-              <a:prstDash val="solid"/>
-              <a:round/>
-            </a:ln>
-          </p:spPr>
-          <p:txBody>
-            <a:bodyPr/>
-            <a:lstStyle/>
-            <a:p/>
-          </p:txBody>
-        </p:sp>
-        <p:sp>
-          <p:nvSpPr>
-            <p:cNvPr id="60" name="pl59"/>
-            <p:cNvSpPr/>
-            <p:nvPr/>
-          </p:nvSpPr>
-          <p:spPr>
-            <a:xfrm>
-              <a:off x="1719564" y="1128778"/>
-              <a:ext cx="3754825" cy="1032834"/>
-            </a:xfrm>
-            <a:custGeom>
-              <a:avLst/>
-              <a:pathLst>
-                <a:path w="3754825" h="1032834">
-                  <a:moveTo>
-                    <a:pt x="0" y="0"/>
-                  </a:moveTo>
-                  <a:lnTo>
-                    <a:pt x="1599277" y="0"/>
-                  </a:lnTo>
-                  <a:lnTo>
-                    <a:pt x="1599277" y="9652"/>
-                  </a:lnTo>
-                  <a:lnTo>
-                    <a:pt x="1807878" y="9652"/>
-                  </a:lnTo>
-                  <a:lnTo>
-                    <a:pt x="1807878" y="57915"/>
-                  </a:lnTo>
-                  <a:lnTo>
-                    <a:pt x="1877412" y="57915"/>
-                  </a:lnTo>
-                  <a:lnTo>
-                    <a:pt x="1877412" y="96526"/>
-                  </a:lnTo>
-                  <a:lnTo>
-                    <a:pt x="2016480" y="96526"/>
-                  </a:lnTo>
-                  <a:lnTo>
-                    <a:pt x="2016480" y="106179"/>
-                  </a:lnTo>
-                  <a:lnTo>
-                    <a:pt x="2086014" y="106179"/>
-                  </a:lnTo>
-                  <a:lnTo>
-                    <a:pt x="2086014" y="135137"/>
-                  </a:lnTo>
-                  <a:lnTo>
-                    <a:pt x="2155547" y="135137"/>
-                  </a:lnTo>
-                  <a:lnTo>
-                    <a:pt x="2155547" y="173747"/>
-                  </a:lnTo>
-                  <a:lnTo>
-                    <a:pt x="2225081" y="173747"/>
-                  </a:lnTo>
-                  <a:lnTo>
-                    <a:pt x="2225081" y="250969"/>
-                  </a:lnTo>
-                  <a:lnTo>
-                    <a:pt x="2294615" y="250969"/>
-                  </a:lnTo>
-                  <a:lnTo>
-                    <a:pt x="2294615" y="308884"/>
-                  </a:lnTo>
-                  <a:lnTo>
-                    <a:pt x="2364149" y="308884"/>
-                  </a:lnTo>
-                  <a:lnTo>
-                    <a:pt x="2364149" y="366800"/>
-                  </a:lnTo>
-                  <a:lnTo>
-                    <a:pt x="2433683" y="366800"/>
-                  </a:lnTo>
-                  <a:lnTo>
-                    <a:pt x="2433683" y="444022"/>
-                  </a:lnTo>
-                  <a:lnTo>
-                    <a:pt x="2503216" y="444022"/>
-                  </a:lnTo>
-                  <a:lnTo>
-                    <a:pt x="2503216" y="550201"/>
-                  </a:lnTo>
-                  <a:lnTo>
-                    <a:pt x="2572750" y="550201"/>
-                  </a:lnTo>
-                  <a:lnTo>
-                    <a:pt x="2572750" y="627422"/>
-                  </a:lnTo>
-                  <a:lnTo>
-                    <a:pt x="2642284" y="627422"/>
-                  </a:lnTo>
-                  <a:lnTo>
-                    <a:pt x="2642284" y="656380"/>
-                  </a:lnTo>
-                  <a:lnTo>
-                    <a:pt x="2711818" y="656380"/>
-                  </a:lnTo>
-                  <a:lnTo>
-                    <a:pt x="2711818" y="694991"/>
-                  </a:lnTo>
-                  <a:lnTo>
-                    <a:pt x="2781352" y="694991"/>
-                  </a:lnTo>
-                  <a:lnTo>
-                    <a:pt x="2781352" y="752907"/>
-                  </a:lnTo>
-                  <a:lnTo>
-                    <a:pt x="2850885" y="752907"/>
-                  </a:lnTo>
-                  <a:lnTo>
-                    <a:pt x="2850885" y="772212"/>
-                  </a:lnTo>
-                  <a:lnTo>
-                    <a:pt x="2989953" y="772212"/>
-                  </a:lnTo>
-                  <a:lnTo>
-                    <a:pt x="2989953" y="791517"/>
-                  </a:lnTo>
-                  <a:lnTo>
-                    <a:pt x="3059487" y="791517"/>
-                  </a:lnTo>
-                  <a:lnTo>
-                    <a:pt x="3059487" y="810823"/>
-                  </a:lnTo>
-                  <a:lnTo>
-                    <a:pt x="3129021" y="810823"/>
-                  </a:lnTo>
-                  <a:lnTo>
-                    <a:pt x="3129021" y="868738"/>
-                  </a:lnTo>
-                  <a:lnTo>
-                    <a:pt x="3198554" y="868738"/>
-                  </a:lnTo>
-                  <a:lnTo>
-                    <a:pt x="3198554" y="878391"/>
-                  </a:lnTo>
-                  <a:lnTo>
-                    <a:pt x="3268088" y="878391"/>
-                  </a:lnTo>
-                  <a:lnTo>
-                    <a:pt x="3268088" y="917002"/>
-                  </a:lnTo>
-                  <a:lnTo>
-                    <a:pt x="3337622" y="917002"/>
-                  </a:lnTo>
-                  <a:lnTo>
-                    <a:pt x="3337622" y="974918"/>
-                  </a:lnTo>
-                  <a:lnTo>
-                    <a:pt x="3407156" y="974918"/>
-                  </a:lnTo>
-                  <a:lnTo>
-                    <a:pt x="3407156" y="1003876"/>
-                  </a:lnTo>
-                  <a:lnTo>
-                    <a:pt x="3476690" y="1003876"/>
-                  </a:lnTo>
-                  <a:lnTo>
-                    <a:pt x="3476690" y="1023181"/>
-                  </a:lnTo>
-                  <a:lnTo>
-                    <a:pt x="3754825" y="1023181"/>
-                  </a:lnTo>
-                  <a:lnTo>
-                    <a:pt x="3754825" y="1032834"/>
+                    <a:pt x="1563877" y="0"/>
+                  </a:lnTo>
+                  <a:lnTo>
+                    <a:pt x="1563877" y="9652"/>
+                  </a:lnTo>
+                  <a:lnTo>
+                    <a:pt x="1767861" y="9652"/>
+                  </a:lnTo>
+                  <a:lnTo>
+                    <a:pt x="1767861" y="57915"/>
+                  </a:lnTo>
+                  <a:lnTo>
+                    <a:pt x="1835856" y="57915"/>
+                  </a:lnTo>
+                  <a:lnTo>
+                    <a:pt x="1835856" y="96526"/>
+                  </a:lnTo>
+                  <a:lnTo>
+                    <a:pt x="1971845" y="96526"/>
+                  </a:lnTo>
+                  <a:lnTo>
+                    <a:pt x="1971845" y="106179"/>
+                  </a:lnTo>
+                  <a:lnTo>
+                    <a:pt x="2039840" y="106179"/>
+                  </a:lnTo>
+                  <a:lnTo>
+                    <a:pt x="2039840" y="135137"/>
+                  </a:lnTo>
+                  <a:lnTo>
+                    <a:pt x="2107835" y="135137"/>
+                  </a:lnTo>
+                  <a:lnTo>
+                    <a:pt x="2107835" y="173747"/>
+                  </a:lnTo>
+                  <a:lnTo>
+                    <a:pt x="2175829" y="173747"/>
+                  </a:lnTo>
+                  <a:lnTo>
+                    <a:pt x="2175829" y="250969"/>
+                  </a:lnTo>
+                  <a:lnTo>
+                    <a:pt x="2243824" y="250969"/>
+                  </a:lnTo>
+                  <a:lnTo>
+                    <a:pt x="2243824" y="308884"/>
+                  </a:lnTo>
+                  <a:lnTo>
+                    <a:pt x="2311819" y="308884"/>
+                  </a:lnTo>
+                  <a:lnTo>
+                    <a:pt x="2311819" y="366800"/>
+                  </a:lnTo>
+                  <a:lnTo>
+                    <a:pt x="2379813" y="366800"/>
+                  </a:lnTo>
+                  <a:lnTo>
+                    <a:pt x="2379813" y="444022"/>
+                  </a:lnTo>
+                  <a:lnTo>
+                    <a:pt x="2447808" y="444022"/>
+                  </a:lnTo>
+                  <a:lnTo>
+                    <a:pt x="2447808" y="550201"/>
+                  </a:lnTo>
+                  <a:lnTo>
+                    <a:pt x="2515803" y="550201"/>
+                  </a:lnTo>
+                  <a:lnTo>
+                    <a:pt x="2515803" y="627422"/>
+                  </a:lnTo>
+                  <a:lnTo>
+                    <a:pt x="2583797" y="627422"/>
+                  </a:lnTo>
+                  <a:lnTo>
+                    <a:pt x="2583797" y="656380"/>
+                  </a:lnTo>
+                  <a:lnTo>
+                    <a:pt x="2651792" y="656380"/>
+                  </a:lnTo>
+                  <a:lnTo>
+                    <a:pt x="2651792" y="694991"/>
+                  </a:lnTo>
+                  <a:lnTo>
+                    <a:pt x="2719787" y="694991"/>
+                  </a:lnTo>
+                  <a:lnTo>
+                    <a:pt x="2719787" y="752907"/>
+                  </a:lnTo>
+                  <a:lnTo>
+                    <a:pt x="2787781" y="752907"/>
+                  </a:lnTo>
+                  <a:lnTo>
+                    <a:pt x="2787781" y="772212"/>
+                  </a:lnTo>
+                  <a:lnTo>
+                    <a:pt x="2923771" y="772212"/>
+                  </a:lnTo>
+                  <a:lnTo>
+                    <a:pt x="2923771" y="791517"/>
+                  </a:lnTo>
+                  <a:lnTo>
+                    <a:pt x="2991766" y="791517"/>
+                  </a:lnTo>
+                  <a:lnTo>
+                    <a:pt x="2991766" y="810823"/>
+                  </a:lnTo>
+                  <a:lnTo>
+                    <a:pt x="3059760" y="810823"/>
+                  </a:lnTo>
+                  <a:lnTo>
+                    <a:pt x="3059760" y="868738"/>
+                  </a:lnTo>
+                  <a:lnTo>
+                    <a:pt x="3127755" y="868738"/>
+                  </a:lnTo>
+                  <a:lnTo>
+                    <a:pt x="3127755" y="878391"/>
+                  </a:lnTo>
+                  <a:lnTo>
+                    <a:pt x="3195750" y="878391"/>
+                  </a:lnTo>
+                  <a:lnTo>
+                    <a:pt x="3195750" y="917002"/>
+                  </a:lnTo>
+                  <a:lnTo>
+                    <a:pt x="3263744" y="917002"/>
+                  </a:lnTo>
+                  <a:lnTo>
+                    <a:pt x="3263744" y="974918"/>
+                  </a:lnTo>
+                  <a:lnTo>
+                    <a:pt x="3331739" y="974918"/>
+                  </a:lnTo>
+                  <a:lnTo>
+                    <a:pt x="3331739" y="1003876"/>
+                  </a:lnTo>
+                  <a:lnTo>
+                    <a:pt x="3399734" y="1003876"/>
+                  </a:lnTo>
+                  <a:lnTo>
+                    <a:pt x="3399734" y="1023181"/>
+                  </a:lnTo>
+                  <a:lnTo>
+                    <a:pt x="3569720" y="1023181"/>
                   </a:lnTo>
                 </a:path>
               </a:pathLst>
@@ -4819,19 +4515,19 @@
         </p:sp>
         <p:sp>
           <p:nvSpPr>
-            <p:cNvPr id="61" name="pl60"/>
-            <p:cNvSpPr/>
-            <p:nvPr/>
-          </p:nvSpPr>
-          <p:spPr>
-            <a:xfrm>
-              <a:off x="1719564" y="1128778"/>
-              <a:ext cx="3754825" cy="1042486"/>
+            <p:cNvPr id="54" name="pl53"/>
+            <p:cNvSpPr/>
+            <p:nvPr/>
+          </p:nvSpPr>
+          <p:spPr>
+            <a:xfrm>
+              <a:off x="1701810" y="1128778"/>
+              <a:ext cx="3569720" cy="1042486"/>
             </a:xfrm>
             <a:custGeom>
               <a:avLst/>
               <a:pathLst>
-                <a:path w="3754825" h="1042486">
+                <a:path w="3569720" h="1042486">
                   <a:moveTo>
                     <a:pt x="0" y="0"/>
                   </a:moveTo>
@@ -4842,172 +4538,169 @@
                     <a:pt x="0" y="9652"/>
                   </a:lnTo>
                   <a:lnTo>
-                    <a:pt x="278135" y="9652"/>
-                  </a:lnTo>
-                  <a:lnTo>
-                    <a:pt x="278135" y="19305"/>
-                  </a:lnTo>
-                  <a:lnTo>
-                    <a:pt x="486736" y="19305"/>
-                  </a:lnTo>
-                  <a:lnTo>
-                    <a:pt x="486736" y="28957"/>
-                  </a:lnTo>
-                  <a:lnTo>
-                    <a:pt x="1321142" y="28957"/>
-                  </a:lnTo>
-                  <a:lnTo>
-                    <a:pt x="1321142" y="38610"/>
-                  </a:lnTo>
-                  <a:lnTo>
-                    <a:pt x="1390676" y="38610"/>
-                  </a:lnTo>
-                  <a:lnTo>
-                    <a:pt x="1390676" y="57915"/>
-                  </a:lnTo>
-                  <a:lnTo>
-                    <a:pt x="1460209" y="57915"/>
-                  </a:lnTo>
-                  <a:lnTo>
-                    <a:pt x="1460209" y="67568"/>
-                  </a:lnTo>
-                  <a:lnTo>
-                    <a:pt x="1529743" y="67568"/>
-                  </a:lnTo>
-                  <a:lnTo>
-                    <a:pt x="1529743" y="86873"/>
-                  </a:lnTo>
-                  <a:lnTo>
-                    <a:pt x="1668811" y="86873"/>
-                  </a:lnTo>
-                  <a:lnTo>
-                    <a:pt x="1668811" y="106179"/>
-                  </a:lnTo>
-                  <a:lnTo>
-                    <a:pt x="1738345" y="106179"/>
-                  </a:lnTo>
-                  <a:lnTo>
-                    <a:pt x="1738345" y="125484"/>
-                  </a:lnTo>
-                  <a:lnTo>
-                    <a:pt x="1807878" y="125484"/>
-                  </a:lnTo>
-                  <a:lnTo>
-                    <a:pt x="1807878" y="164095"/>
-                  </a:lnTo>
-                  <a:lnTo>
-                    <a:pt x="1877412" y="164095"/>
-                  </a:lnTo>
-                  <a:lnTo>
-                    <a:pt x="1877412" y="241316"/>
-                  </a:lnTo>
-                  <a:lnTo>
-                    <a:pt x="1946946" y="241316"/>
-                  </a:lnTo>
-                  <a:lnTo>
-                    <a:pt x="1946946" y="279927"/>
-                  </a:lnTo>
-                  <a:lnTo>
-                    <a:pt x="2016480" y="279927"/>
-                  </a:lnTo>
-                  <a:lnTo>
-                    <a:pt x="2016480" y="357148"/>
-                  </a:lnTo>
-                  <a:lnTo>
-                    <a:pt x="2086014" y="357148"/>
-                  </a:lnTo>
-                  <a:lnTo>
-                    <a:pt x="2086014" y="501938"/>
-                  </a:lnTo>
-                  <a:lnTo>
-                    <a:pt x="2155547" y="501938"/>
-                  </a:lnTo>
-                  <a:lnTo>
-                    <a:pt x="2155547" y="559854"/>
-                  </a:lnTo>
-                  <a:lnTo>
-                    <a:pt x="2225081" y="559854"/>
-                  </a:lnTo>
-                  <a:lnTo>
-                    <a:pt x="2225081" y="588811"/>
-                  </a:lnTo>
-                  <a:lnTo>
-                    <a:pt x="2294615" y="588811"/>
-                  </a:lnTo>
-                  <a:lnTo>
-                    <a:pt x="2294615" y="675685"/>
-                  </a:lnTo>
-                  <a:lnTo>
-                    <a:pt x="2364149" y="675685"/>
-                  </a:lnTo>
-                  <a:lnTo>
-                    <a:pt x="2364149" y="733601"/>
-                  </a:lnTo>
-                  <a:lnTo>
-                    <a:pt x="2433683" y="733601"/>
-                  </a:lnTo>
-                  <a:lnTo>
-                    <a:pt x="2433683" y="810823"/>
-                  </a:lnTo>
-                  <a:lnTo>
-                    <a:pt x="2503216" y="810823"/>
-                  </a:lnTo>
-                  <a:lnTo>
-                    <a:pt x="2503216" y="849433"/>
-                  </a:lnTo>
-                  <a:lnTo>
-                    <a:pt x="2572750" y="849433"/>
-                  </a:lnTo>
-                  <a:lnTo>
-                    <a:pt x="2572750" y="907349"/>
-                  </a:lnTo>
-                  <a:lnTo>
-                    <a:pt x="2642284" y="907349"/>
-                  </a:lnTo>
-                  <a:lnTo>
-                    <a:pt x="2642284" y="936307"/>
-                  </a:lnTo>
-                  <a:lnTo>
-                    <a:pt x="2781352" y="936307"/>
-                  </a:lnTo>
-                  <a:lnTo>
-                    <a:pt x="2781352" y="965265"/>
-                  </a:lnTo>
-                  <a:lnTo>
-                    <a:pt x="2850885" y="965265"/>
-                  </a:lnTo>
-                  <a:lnTo>
-                    <a:pt x="2850885" y="984570"/>
-                  </a:lnTo>
-                  <a:lnTo>
-                    <a:pt x="2920419" y="984570"/>
-                  </a:lnTo>
-                  <a:lnTo>
-                    <a:pt x="2920419" y="994223"/>
-                  </a:lnTo>
-                  <a:lnTo>
-                    <a:pt x="2989953" y="994223"/>
-                  </a:lnTo>
-                  <a:lnTo>
-                    <a:pt x="2989953" y="1023181"/>
-                  </a:lnTo>
-                  <a:lnTo>
-                    <a:pt x="3337622" y="1023181"/>
-                  </a:lnTo>
-                  <a:lnTo>
-                    <a:pt x="3337622" y="1032834"/>
-                  </a:lnTo>
-                  <a:lnTo>
-                    <a:pt x="3407156" y="1032834"/>
-                  </a:lnTo>
-                  <a:lnTo>
-                    <a:pt x="3407156" y="1042486"/>
-                  </a:lnTo>
-                  <a:lnTo>
-                    <a:pt x="3754825" y="1042486"/>
-                  </a:lnTo>
-                  <a:lnTo>
-                    <a:pt x="3754825" y="1042486"/>
+                    <a:pt x="271978" y="9652"/>
+                  </a:lnTo>
+                  <a:lnTo>
+                    <a:pt x="271978" y="19305"/>
+                  </a:lnTo>
+                  <a:lnTo>
+                    <a:pt x="475962" y="19305"/>
+                  </a:lnTo>
+                  <a:lnTo>
+                    <a:pt x="475962" y="28957"/>
+                  </a:lnTo>
+                  <a:lnTo>
+                    <a:pt x="1291898" y="28957"/>
+                  </a:lnTo>
+                  <a:lnTo>
+                    <a:pt x="1291898" y="38610"/>
+                  </a:lnTo>
+                  <a:lnTo>
+                    <a:pt x="1359893" y="38610"/>
+                  </a:lnTo>
+                  <a:lnTo>
+                    <a:pt x="1359893" y="57915"/>
+                  </a:lnTo>
+                  <a:lnTo>
+                    <a:pt x="1427888" y="57915"/>
+                  </a:lnTo>
+                  <a:lnTo>
+                    <a:pt x="1427888" y="67568"/>
+                  </a:lnTo>
+                  <a:lnTo>
+                    <a:pt x="1495883" y="67568"/>
+                  </a:lnTo>
+                  <a:lnTo>
+                    <a:pt x="1495883" y="86873"/>
+                  </a:lnTo>
+                  <a:lnTo>
+                    <a:pt x="1631872" y="86873"/>
+                  </a:lnTo>
+                  <a:lnTo>
+                    <a:pt x="1631872" y="106179"/>
+                  </a:lnTo>
+                  <a:lnTo>
+                    <a:pt x="1699867" y="106179"/>
+                  </a:lnTo>
+                  <a:lnTo>
+                    <a:pt x="1699867" y="125484"/>
+                  </a:lnTo>
+                  <a:lnTo>
+                    <a:pt x="1767861" y="125484"/>
+                  </a:lnTo>
+                  <a:lnTo>
+                    <a:pt x="1767861" y="164095"/>
+                  </a:lnTo>
+                  <a:lnTo>
+                    <a:pt x="1835856" y="164095"/>
+                  </a:lnTo>
+                  <a:lnTo>
+                    <a:pt x="1835856" y="241316"/>
+                  </a:lnTo>
+                  <a:lnTo>
+                    <a:pt x="1903851" y="241316"/>
+                  </a:lnTo>
+                  <a:lnTo>
+                    <a:pt x="1903851" y="279927"/>
+                  </a:lnTo>
+                  <a:lnTo>
+                    <a:pt x="1971845" y="279927"/>
+                  </a:lnTo>
+                  <a:lnTo>
+                    <a:pt x="1971845" y="357148"/>
+                  </a:lnTo>
+                  <a:lnTo>
+                    <a:pt x="2039840" y="357148"/>
+                  </a:lnTo>
+                  <a:lnTo>
+                    <a:pt x="2039840" y="501938"/>
+                  </a:lnTo>
+                  <a:lnTo>
+                    <a:pt x="2107835" y="501938"/>
+                  </a:lnTo>
+                  <a:lnTo>
+                    <a:pt x="2107835" y="559854"/>
+                  </a:lnTo>
+                  <a:lnTo>
+                    <a:pt x="2175829" y="559854"/>
+                  </a:lnTo>
+                  <a:lnTo>
+                    <a:pt x="2175829" y="588811"/>
+                  </a:lnTo>
+                  <a:lnTo>
+                    <a:pt x="2243824" y="588811"/>
+                  </a:lnTo>
+                  <a:lnTo>
+                    <a:pt x="2243824" y="675685"/>
+                  </a:lnTo>
+                  <a:lnTo>
+                    <a:pt x="2311819" y="675685"/>
+                  </a:lnTo>
+                  <a:lnTo>
+                    <a:pt x="2311819" y="733601"/>
+                  </a:lnTo>
+                  <a:lnTo>
+                    <a:pt x="2379813" y="733601"/>
+                  </a:lnTo>
+                  <a:lnTo>
+                    <a:pt x="2379813" y="810823"/>
+                  </a:lnTo>
+                  <a:lnTo>
+                    <a:pt x="2447808" y="810823"/>
+                  </a:lnTo>
+                  <a:lnTo>
+                    <a:pt x="2447808" y="849433"/>
+                  </a:lnTo>
+                  <a:lnTo>
+                    <a:pt x="2515803" y="849433"/>
+                  </a:lnTo>
+                  <a:lnTo>
+                    <a:pt x="2515803" y="907349"/>
+                  </a:lnTo>
+                  <a:lnTo>
+                    <a:pt x="2583797" y="907349"/>
+                  </a:lnTo>
+                  <a:lnTo>
+                    <a:pt x="2583797" y="936307"/>
+                  </a:lnTo>
+                  <a:lnTo>
+                    <a:pt x="2719787" y="936307"/>
+                  </a:lnTo>
+                  <a:lnTo>
+                    <a:pt x="2719787" y="965265"/>
+                  </a:lnTo>
+                  <a:lnTo>
+                    <a:pt x="2787781" y="965265"/>
+                  </a:lnTo>
+                  <a:lnTo>
+                    <a:pt x="2787781" y="984570"/>
+                  </a:lnTo>
+                  <a:lnTo>
+                    <a:pt x="2855776" y="984570"/>
+                  </a:lnTo>
+                  <a:lnTo>
+                    <a:pt x="2855776" y="994223"/>
+                  </a:lnTo>
+                  <a:lnTo>
+                    <a:pt x="2923771" y="994223"/>
+                  </a:lnTo>
+                  <a:lnTo>
+                    <a:pt x="2923771" y="1023181"/>
+                  </a:lnTo>
+                  <a:lnTo>
+                    <a:pt x="3263744" y="1023181"/>
+                  </a:lnTo>
+                  <a:lnTo>
+                    <a:pt x="3263744" y="1032834"/>
+                  </a:lnTo>
+                  <a:lnTo>
+                    <a:pt x="3331739" y="1032834"/>
+                  </a:lnTo>
+                  <a:lnTo>
+                    <a:pt x="3331739" y="1042486"/>
+                  </a:lnTo>
+                  <a:lnTo>
+                    <a:pt x="3569720" y="1042486"/>
                   </a:lnTo>
                 </a:path>
               </a:pathLst>
@@ -5030,177 +4723,174 @@
         </p:sp>
         <p:sp>
           <p:nvSpPr>
-            <p:cNvPr id="62" name="pl61"/>
-            <p:cNvSpPr/>
-            <p:nvPr/>
-          </p:nvSpPr>
-          <p:spPr>
-            <a:xfrm>
-              <a:off x="1719564" y="1128778"/>
-              <a:ext cx="3754825" cy="849433"/>
+            <p:cNvPr id="55" name="pl54"/>
+            <p:cNvSpPr/>
+            <p:nvPr/>
+          </p:nvSpPr>
+          <p:spPr>
+            <a:xfrm>
+              <a:off x="1701810" y="1128778"/>
+              <a:ext cx="3569720" cy="849433"/>
             </a:xfrm>
             <a:custGeom>
               <a:avLst/>
               <a:pathLst>
-                <a:path w="3754825" h="849433">
+                <a:path w="3569720" h="849433">
                   <a:moveTo>
                     <a:pt x="0" y="0"/>
                   </a:moveTo>
                   <a:lnTo>
-                    <a:pt x="1390676" y="0"/>
-                  </a:lnTo>
-                  <a:lnTo>
-                    <a:pt x="1390676" y="9652"/>
-                  </a:lnTo>
-                  <a:lnTo>
-                    <a:pt x="1529743" y="9652"/>
-                  </a:lnTo>
-                  <a:lnTo>
-                    <a:pt x="1529743" y="19305"/>
-                  </a:lnTo>
-                  <a:lnTo>
-                    <a:pt x="1668811" y="19305"/>
-                  </a:lnTo>
-                  <a:lnTo>
-                    <a:pt x="1668811" y="28957"/>
-                  </a:lnTo>
-                  <a:lnTo>
-                    <a:pt x="1807878" y="28957"/>
-                  </a:lnTo>
-                  <a:lnTo>
-                    <a:pt x="1807878" y="48263"/>
-                  </a:lnTo>
-                  <a:lnTo>
-                    <a:pt x="1877412" y="48263"/>
-                  </a:lnTo>
-                  <a:lnTo>
-                    <a:pt x="1877412" y="77221"/>
-                  </a:lnTo>
-                  <a:lnTo>
-                    <a:pt x="1946946" y="77221"/>
-                  </a:lnTo>
-                  <a:lnTo>
-                    <a:pt x="1946946" y="106179"/>
-                  </a:lnTo>
-                  <a:lnTo>
-                    <a:pt x="2016480" y="106179"/>
-                  </a:lnTo>
-                  <a:lnTo>
-                    <a:pt x="2016480" y="125484"/>
-                  </a:lnTo>
-                  <a:lnTo>
-                    <a:pt x="2086014" y="125484"/>
-                  </a:lnTo>
-                  <a:lnTo>
-                    <a:pt x="2086014" y="173747"/>
-                  </a:lnTo>
-                  <a:lnTo>
-                    <a:pt x="2155547" y="173747"/>
-                  </a:lnTo>
-                  <a:lnTo>
-                    <a:pt x="2155547" y="241316"/>
-                  </a:lnTo>
-                  <a:lnTo>
-                    <a:pt x="2225081" y="241316"/>
-                  </a:lnTo>
-                  <a:lnTo>
-                    <a:pt x="2225081" y="260621"/>
-                  </a:lnTo>
-                  <a:lnTo>
-                    <a:pt x="2294615" y="260621"/>
-                  </a:lnTo>
-                  <a:lnTo>
-                    <a:pt x="2294615" y="366800"/>
-                  </a:lnTo>
-                  <a:lnTo>
-                    <a:pt x="2364149" y="366800"/>
-                  </a:lnTo>
-                  <a:lnTo>
-                    <a:pt x="2364149" y="444022"/>
-                  </a:lnTo>
-                  <a:lnTo>
-                    <a:pt x="2433683" y="444022"/>
-                  </a:lnTo>
-                  <a:lnTo>
-                    <a:pt x="2433683" y="540548"/>
-                  </a:lnTo>
-                  <a:lnTo>
-                    <a:pt x="2503216" y="540548"/>
-                  </a:lnTo>
-                  <a:lnTo>
-                    <a:pt x="2503216" y="598464"/>
-                  </a:lnTo>
-                  <a:lnTo>
-                    <a:pt x="2572750" y="598464"/>
-                  </a:lnTo>
-                  <a:lnTo>
-                    <a:pt x="2572750" y="656380"/>
-                  </a:lnTo>
-                  <a:lnTo>
-                    <a:pt x="2642284" y="656380"/>
-                  </a:lnTo>
-                  <a:lnTo>
-                    <a:pt x="2642284" y="694991"/>
-                  </a:lnTo>
-                  <a:lnTo>
-                    <a:pt x="2711818" y="694991"/>
-                  </a:lnTo>
-                  <a:lnTo>
-                    <a:pt x="2711818" y="723949"/>
-                  </a:lnTo>
-                  <a:lnTo>
-                    <a:pt x="2781352" y="723949"/>
-                  </a:lnTo>
-                  <a:lnTo>
-                    <a:pt x="2781352" y="733601"/>
-                  </a:lnTo>
-                  <a:lnTo>
-                    <a:pt x="2850885" y="733601"/>
-                  </a:lnTo>
-                  <a:lnTo>
-                    <a:pt x="2850885" y="762559"/>
-                  </a:lnTo>
-                  <a:lnTo>
-                    <a:pt x="2989953" y="762559"/>
-                  </a:lnTo>
-                  <a:lnTo>
-                    <a:pt x="2989953" y="772212"/>
-                  </a:lnTo>
-                  <a:lnTo>
-                    <a:pt x="3059487" y="772212"/>
-                  </a:lnTo>
-                  <a:lnTo>
-                    <a:pt x="3059487" y="781865"/>
-                  </a:lnTo>
-                  <a:lnTo>
-                    <a:pt x="3129021" y="781865"/>
-                  </a:lnTo>
-                  <a:lnTo>
-                    <a:pt x="3129021" y="810823"/>
-                  </a:lnTo>
-                  <a:lnTo>
-                    <a:pt x="3337622" y="810823"/>
-                  </a:lnTo>
-                  <a:lnTo>
-                    <a:pt x="3337622" y="820475"/>
-                  </a:lnTo>
-                  <a:lnTo>
-                    <a:pt x="3407156" y="820475"/>
-                  </a:lnTo>
-                  <a:lnTo>
-                    <a:pt x="3407156" y="839781"/>
-                  </a:lnTo>
-                  <a:lnTo>
-                    <a:pt x="3546223" y="839781"/>
-                  </a:lnTo>
-                  <a:lnTo>
-                    <a:pt x="3546223" y="849433"/>
-                  </a:lnTo>
-                  <a:lnTo>
-                    <a:pt x="3754825" y="849433"/>
-                  </a:lnTo>
-                  <a:lnTo>
-                    <a:pt x="3754825" y="849433"/>
+                    <a:pt x="1359893" y="0"/>
+                  </a:lnTo>
+                  <a:lnTo>
+                    <a:pt x="1359893" y="9652"/>
+                  </a:lnTo>
+                  <a:lnTo>
+                    <a:pt x="1495883" y="9652"/>
+                  </a:lnTo>
+                  <a:lnTo>
+                    <a:pt x="1495883" y="19305"/>
+                  </a:lnTo>
+                  <a:lnTo>
+                    <a:pt x="1631872" y="19305"/>
+                  </a:lnTo>
+                  <a:lnTo>
+                    <a:pt x="1631872" y="28957"/>
+                  </a:lnTo>
+                  <a:lnTo>
+                    <a:pt x="1767861" y="28957"/>
+                  </a:lnTo>
+                  <a:lnTo>
+                    <a:pt x="1767861" y="48263"/>
+                  </a:lnTo>
+                  <a:lnTo>
+                    <a:pt x="1835856" y="48263"/>
+                  </a:lnTo>
+                  <a:lnTo>
+                    <a:pt x="1835856" y="77221"/>
+                  </a:lnTo>
+                  <a:lnTo>
+                    <a:pt x="1903851" y="77221"/>
+                  </a:lnTo>
+                  <a:lnTo>
+                    <a:pt x="1903851" y="106179"/>
+                  </a:lnTo>
+                  <a:lnTo>
+                    <a:pt x="1971845" y="106179"/>
+                  </a:lnTo>
+                  <a:lnTo>
+                    <a:pt x="1971845" y="125484"/>
+                  </a:lnTo>
+                  <a:lnTo>
+                    <a:pt x="2039840" y="125484"/>
+                  </a:lnTo>
+                  <a:lnTo>
+                    <a:pt x="2039840" y="173747"/>
+                  </a:lnTo>
+                  <a:lnTo>
+                    <a:pt x="2107835" y="173747"/>
+                  </a:lnTo>
+                  <a:lnTo>
+                    <a:pt x="2107835" y="241316"/>
+                  </a:lnTo>
+                  <a:lnTo>
+                    <a:pt x="2175829" y="241316"/>
+                  </a:lnTo>
+                  <a:lnTo>
+                    <a:pt x="2175829" y="260621"/>
+                  </a:lnTo>
+                  <a:lnTo>
+                    <a:pt x="2243824" y="260621"/>
+                  </a:lnTo>
+                  <a:lnTo>
+                    <a:pt x="2243824" y="366800"/>
+                  </a:lnTo>
+                  <a:lnTo>
+                    <a:pt x="2311819" y="366800"/>
+                  </a:lnTo>
+                  <a:lnTo>
+                    <a:pt x="2311819" y="444022"/>
+                  </a:lnTo>
+                  <a:lnTo>
+                    <a:pt x="2379813" y="444022"/>
+                  </a:lnTo>
+                  <a:lnTo>
+                    <a:pt x="2379813" y="540548"/>
+                  </a:lnTo>
+                  <a:lnTo>
+                    <a:pt x="2447808" y="540548"/>
+                  </a:lnTo>
+                  <a:lnTo>
+                    <a:pt x="2447808" y="598464"/>
+                  </a:lnTo>
+                  <a:lnTo>
+                    <a:pt x="2515803" y="598464"/>
+                  </a:lnTo>
+                  <a:lnTo>
+                    <a:pt x="2515803" y="656380"/>
+                  </a:lnTo>
+                  <a:lnTo>
+                    <a:pt x="2583797" y="656380"/>
+                  </a:lnTo>
+                  <a:lnTo>
+                    <a:pt x="2583797" y="694991"/>
+                  </a:lnTo>
+                  <a:lnTo>
+                    <a:pt x="2651792" y="694991"/>
+                  </a:lnTo>
+                  <a:lnTo>
+                    <a:pt x="2651792" y="723949"/>
+                  </a:lnTo>
+                  <a:lnTo>
+                    <a:pt x="2719787" y="723949"/>
+                  </a:lnTo>
+                  <a:lnTo>
+                    <a:pt x="2719787" y="733601"/>
+                  </a:lnTo>
+                  <a:lnTo>
+                    <a:pt x="2787781" y="733601"/>
+                  </a:lnTo>
+                  <a:lnTo>
+                    <a:pt x="2787781" y="762559"/>
+                  </a:lnTo>
+                  <a:lnTo>
+                    <a:pt x="2923771" y="762559"/>
+                  </a:lnTo>
+                  <a:lnTo>
+                    <a:pt x="2923771" y="772212"/>
+                  </a:lnTo>
+                  <a:lnTo>
+                    <a:pt x="2991766" y="772212"/>
+                  </a:lnTo>
+                  <a:lnTo>
+                    <a:pt x="2991766" y="781865"/>
+                  </a:lnTo>
+                  <a:lnTo>
+                    <a:pt x="3059760" y="781865"/>
+                  </a:lnTo>
+                  <a:lnTo>
+                    <a:pt x="3059760" y="810823"/>
+                  </a:lnTo>
+                  <a:lnTo>
+                    <a:pt x="3263744" y="810823"/>
+                  </a:lnTo>
+                  <a:lnTo>
+                    <a:pt x="3263744" y="820475"/>
+                  </a:lnTo>
+                  <a:lnTo>
+                    <a:pt x="3331739" y="820475"/>
+                  </a:lnTo>
+                  <a:lnTo>
+                    <a:pt x="3331739" y="839781"/>
+                  </a:lnTo>
+                  <a:lnTo>
+                    <a:pt x="3467728" y="839781"/>
+                  </a:lnTo>
+                  <a:lnTo>
+                    <a:pt x="3467728" y="849433"/>
+                  </a:lnTo>
+                  <a:lnTo>
+                    <a:pt x="3569720" y="849433"/>
                   </a:lnTo>
                 </a:path>
               </a:pathLst>
@@ -5223,177 +4913,174 @@
         </p:sp>
         <p:sp>
           <p:nvSpPr>
-            <p:cNvPr id="63" name="pl62"/>
-            <p:cNvSpPr/>
-            <p:nvPr/>
-          </p:nvSpPr>
-          <p:spPr>
-            <a:xfrm>
-              <a:off x="1719564" y="1128778"/>
-              <a:ext cx="3754825" cy="926654"/>
+            <p:cNvPr id="56" name="pl55"/>
+            <p:cNvSpPr/>
+            <p:nvPr/>
+          </p:nvSpPr>
+          <p:spPr>
+            <a:xfrm>
+              <a:off x="1701810" y="1128778"/>
+              <a:ext cx="3569720" cy="917002"/>
             </a:xfrm>
             <a:custGeom>
               <a:avLst/>
               <a:pathLst>
-                <a:path w="3754825" h="926654">
+                <a:path w="3569720" h="917002">
                   <a:moveTo>
                     <a:pt x="0" y="0"/>
                   </a:moveTo>
                   <a:lnTo>
-                    <a:pt x="1321142" y="0"/>
-                  </a:lnTo>
-                  <a:lnTo>
-                    <a:pt x="1321142" y="9652"/>
-                  </a:lnTo>
-                  <a:lnTo>
-                    <a:pt x="1460209" y="9652"/>
-                  </a:lnTo>
-                  <a:lnTo>
-                    <a:pt x="1460209" y="19305"/>
-                  </a:lnTo>
-                  <a:lnTo>
-                    <a:pt x="1529743" y="19305"/>
-                  </a:lnTo>
-                  <a:lnTo>
-                    <a:pt x="1529743" y="28957"/>
-                  </a:lnTo>
-                  <a:lnTo>
-                    <a:pt x="1738345" y="28957"/>
-                  </a:lnTo>
-                  <a:lnTo>
-                    <a:pt x="1738345" y="38610"/>
-                  </a:lnTo>
-                  <a:lnTo>
-                    <a:pt x="1807878" y="38610"/>
-                  </a:lnTo>
-                  <a:lnTo>
-                    <a:pt x="1807878" y="57915"/>
-                  </a:lnTo>
-                  <a:lnTo>
-                    <a:pt x="1877412" y="57915"/>
-                  </a:lnTo>
-                  <a:lnTo>
-                    <a:pt x="1877412" y="77221"/>
-                  </a:lnTo>
-                  <a:lnTo>
-                    <a:pt x="1946946" y="77221"/>
-                  </a:lnTo>
-                  <a:lnTo>
-                    <a:pt x="1946946" y="86873"/>
-                  </a:lnTo>
-                  <a:lnTo>
-                    <a:pt x="2016480" y="86873"/>
-                  </a:lnTo>
-                  <a:lnTo>
-                    <a:pt x="2016480" y="154442"/>
-                  </a:lnTo>
-                  <a:lnTo>
-                    <a:pt x="2086014" y="154442"/>
-                  </a:lnTo>
-                  <a:lnTo>
-                    <a:pt x="2086014" y="222011"/>
-                  </a:lnTo>
-                  <a:lnTo>
-                    <a:pt x="2155547" y="222011"/>
-                  </a:lnTo>
-                  <a:lnTo>
-                    <a:pt x="2155547" y="318537"/>
-                  </a:lnTo>
-                  <a:lnTo>
-                    <a:pt x="2225081" y="318537"/>
-                  </a:lnTo>
-                  <a:lnTo>
-                    <a:pt x="2225081" y="357148"/>
-                  </a:lnTo>
-                  <a:lnTo>
-                    <a:pt x="2294615" y="357148"/>
-                  </a:lnTo>
-                  <a:lnTo>
-                    <a:pt x="2294615" y="386106"/>
-                  </a:lnTo>
-                  <a:lnTo>
-                    <a:pt x="2364149" y="386106"/>
-                  </a:lnTo>
-                  <a:lnTo>
-                    <a:pt x="2364149" y="453674"/>
-                  </a:lnTo>
-                  <a:lnTo>
-                    <a:pt x="2433683" y="453674"/>
-                  </a:lnTo>
-                  <a:lnTo>
-                    <a:pt x="2433683" y="579159"/>
-                  </a:lnTo>
-                  <a:lnTo>
-                    <a:pt x="2503216" y="579159"/>
-                  </a:lnTo>
-                  <a:lnTo>
-                    <a:pt x="2503216" y="656380"/>
-                  </a:lnTo>
-                  <a:lnTo>
-                    <a:pt x="2572750" y="656380"/>
-                  </a:lnTo>
-                  <a:lnTo>
-                    <a:pt x="2572750" y="694991"/>
-                  </a:lnTo>
-                  <a:lnTo>
-                    <a:pt x="2642284" y="694991"/>
-                  </a:lnTo>
-                  <a:lnTo>
-                    <a:pt x="2642284" y="762559"/>
-                  </a:lnTo>
-                  <a:lnTo>
-                    <a:pt x="2711818" y="762559"/>
-                  </a:lnTo>
-                  <a:lnTo>
-                    <a:pt x="2711818" y="810823"/>
-                  </a:lnTo>
-                  <a:lnTo>
-                    <a:pt x="2781352" y="810823"/>
-                  </a:lnTo>
-                  <a:lnTo>
-                    <a:pt x="2781352" y="830128"/>
-                  </a:lnTo>
-                  <a:lnTo>
-                    <a:pt x="2920419" y="830128"/>
-                  </a:lnTo>
-                  <a:lnTo>
-                    <a:pt x="2920419" y="839781"/>
-                  </a:lnTo>
-                  <a:lnTo>
-                    <a:pt x="3129021" y="839781"/>
-                  </a:lnTo>
-                  <a:lnTo>
-                    <a:pt x="3129021" y="859086"/>
-                  </a:lnTo>
-                  <a:lnTo>
-                    <a:pt x="3198554" y="859086"/>
-                  </a:lnTo>
-                  <a:lnTo>
-                    <a:pt x="3198554" y="868738"/>
-                  </a:lnTo>
-                  <a:lnTo>
-                    <a:pt x="3268088" y="868738"/>
-                  </a:lnTo>
-                  <a:lnTo>
-                    <a:pt x="3268088" y="888044"/>
-                  </a:lnTo>
-                  <a:lnTo>
-                    <a:pt x="3337622" y="888044"/>
-                  </a:lnTo>
-                  <a:lnTo>
-                    <a:pt x="3337622" y="907349"/>
-                  </a:lnTo>
-                  <a:lnTo>
-                    <a:pt x="3546223" y="907349"/>
-                  </a:lnTo>
-                  <a:lnTo>
-                    <a:pt x="3546223" y="917002"/>
-                  </a:lnTo>
-                  <a:lnTo>
-                    <a:pt x="3754825" y="917002"/>
-                  </a:lnTo>
-                  <a:lnTo>
-                    <a:pt x="3754825" y="926654"/>
+                    <a:pt x="1291898" y="0"/>
+                  </a:lnTo>
+                  <a:lnTo>
+                    <a:pt x="1291898" y="9652"/>
+                  </a:lnTo>
+                  <a:lnTo>
+                    <a:pt x="1427888" y="9652"/>
+                  </a:lnTo>
+                  <a:lnTo>
+                    <a:pt x="1427888" y="19305"/>
+                  </a:lnTo>
+                  <a:lnTo>
+                    <a:pt x="1495883" y="19305"/>
+                  </a:lnTo>
+                  <a:lnTo>
+                    <a:pt x="1495883" y="28957"/>
+                  </a:lnTo>
+                  <a:lnTo>
+                    <a:pt x="1699867" y="28957"/>
+                  </a:lnTo>
+                  <a:lnTo>
+                    <a:pt x="1699867" y="38610"/>
+                  </a:lnTo>
+                  <a:lnTo>
+                    <a:pt x="1767861" y="38610"/>
+                  </a:lnTo>
+                  <a:lnTo>
+                    <a:pt x="1767861" y="57915"/>
+                  </a:lnTo>
+                  <a:lnTo>
+                    <a:pt x="1835856" y="57915"/>
+                  </a:lnTo>
+                  <a:lnTo>
+                    <a:pt x="1835856" y="77221"/>
+                  </a:lnTo>
+                  <a:lnTo>
+                    <a:pt x="1903851" y="77221"/>
+                  </a:lnTo>
+                  <a:lnTo>
+                    <a:pt x="1903851" y="86873"/>
+                  </a:lnTo>
+                  <a:lnTo>
+                    <a:pt x="1971845" y="86873"/>
+                  </a:lnTo>
+                  <a:lnTo>
+                    <a:pt x="1971845" y="154442"/>
+                  </a:lnTo>
+                  <a:lnTo>
+                    <a:pt x="2039840" y="154442"/>
+                  </a:lnTo>
+                  <a:lnTo>
+                    <a:pt x="2039840" y="222011"/>
+                  </a:lnTo>
+                  <a:lnTo>
+                    <a:pt x="2107835" y="222011"/>
+                  </a:lnTo>
+                  <a:lnTo>
+                    <a:pt x="2107835" y="318537"/>
+                  </a:lnTo>
+                  <a:lnTo>
+                    <a:pt x="2175829" y="318537"/>
+                  </a:lnTo>
+                  <a:lnTo>
+                    <a:pt x="2175829" y="357148"/>
+                  </a:lnTo>
+                  <a:lnTo>
+                    <a:pt x="2243824" y="357148"/>
+                  </a:lnTo>
+                  <a:lnTo>
+                    <a:pt x="2243824" y="386106"/>
+                  </a:lnTo>
+                  <a:lnTo>
+                    <a:pt x="2311819" y="386106"/>
+                  </a:lnTo>
+                  <a:lnTo>
+                    <a:pt x="2311819" y="453674"/>
+                  </a:lnTo>
+                  <a:lnTo>
+                    <a:pt x="2379813" y="453674"/>
+                  </a:lnTo>
+                  <a:lnTo>
+                    <a:pt x="2379813" y="579159"/>
+                  </a:lnTo>
+                  <a:lnTo>
+                    <a:pt x="2447808" y="579159"/>
+                  </a:lnTo>
+                  <a:lnTo>
+                    <a:pt x="2447808" y="656380"/>
+                  </a:lnTo>
+                  <a:lnTo>
+                    <a:pt x="2515803" y="656380"/>
+                  </a:lnTo>
+                  <a:lnTo>
+                    <a:pt x="2515803" y="694991"/>
+                  </a:lnTo>
+                  <a:lnTo>
+                    <a:pt x="2583797" y="694991"/>
+                  </a:lnTo>
+                  <a:lnTo>
+                    <a:pt x="2583797" y="762559"/>
+                  </a:lnTo>
+                  <a:lnTo>
+                    <a:pt x="2651792" y="762559"/>
+                  </a:lnTo>
+                  <a:lnTo>
+                    <a:pt x="2651792" y="810823"/>
+                  </a:lnTo>
+                  <a:lnTo>
+                    <a:pt x="2719787" y="810823"/>
+                  </a:lnTo>
+                  <a:lnTo>
+                    <a:pt x="2719787" y="830128"/>
+                  </a:lnTo>
+                  <a:lnTo>
+                    <a:pt x="2855776" y="830128"/>
+                  </a:lnTo>
+                  <a:lnTo>
+                    <a:pt x="2855776" y="839781"/>
+                  </a:lnTo>
+                  <a:lnTo>
+                    <a:pt x="3059760" y="839781"/>
+                  </a:lnTo>
+                  <a:lnTo>
+                    <a:pt x="3059760" y="859086"/>
+                  </a:lnTo>
+                  <a:lnTo>
+                    <a:pt x="3127755" y="859086"/>
+                  </a:lnTo>
+                  <a:lnTo>
+                    <a:pt x="3127755" y="868738"/>
+                  </a:lnTo>
+                  <a:lnTo>
+                    <a:pt x="3195750" y="868738"/>
+                  </a:lnTo>
+                  <a:lnTo>
+                    <a:pt x="3195750" y="888044"/>
+                  </a:lnTo>
+                  <a:lnTo>
+                    <a:pt x="3263744" y="888044"/>
+                  </a:lnTo>
+                  <a:lnTo>
+                    <a:pt x="3263744" y="907349"/>
+                  </a:lnTo>
+                  <a:lnTo>
+                    <a:pt x="3467728" y="907349"/>
+                  </a:lnTo>
+                  <a:lnTo>
+                    <a:pt x="3467728" y="917002"/>
+                  </a:lnTo>
+                  <a:lnTo>
+                    <a:pt x="3569720" y="917002"/>
                   </a:lnTo>
                 </a:path>
               </a:pathLst>
@@ -5416,13 +5103,13 @@
         </p:sp>
         <p:sp>
           <p:nvSpPr>
-            <p:cNvPr id="64" name="tx63"/>
-            <p:cNvSpPr/>
-            <p:nvPr/>
-          </p:nvSpPr>
-          <p:spPr>
-            <a:xfrm>
-              <a:off x="5401239" y="2106877"/>
+            <p:cNvPr id="57" name="tx56"/>
+            <p:cNvSpPr/>
+            <p:nvPr/>
+          </p:nvSpPr>
+          <p:spPr>
+            <a:xfrm>
+              <a:off x="5300371" y="2106877"/>
               <a:ext cx="146301" cy="109470"/>
             </a:xfrm>
             <a:prstGeom prst="rect">
@@ -5462,13 +5149,13 @@
         </p:sp>
         <p:sp>
           <p:nvSpPr>
-            <p:cNvPr id="65" name="tx64"/>
-            <p:cNvSpPr/>
-            <p:nvPr/>
-          </p:nvSpPr>
-          <p:spPr>
-            <a:xfrm>
-              <a:off x="5401239" y="2116530"/>
+            <p:cNvPr id="58" name="tx57"/>
+            <p:cNvSpPr/>
+            <p:nvPr/>
+          </p:nvSpPr>
+          <p:spPr>
+            <a:xfrm>
+              <a:off x="5300371" y="2116530"/>
               <a:ext cx="146301" cy="109470"/>
             </a:xfrm>
             <a:prstGeom prst="rect">
@@ -5508,13 +5195,13 @@
         </p:sp>
         <p:sp>
           <p:nvSpPr>
-            <p:cNvPr id="66" name="tx65"/>
-            <p:cNvSpPr/>
-            <p:nvPr/>
-          </p:nvSpPr>
-          <p:spPr>
-            <a:xfrm>
-              <a:off x="5401239" y="1923477"/>
+            <p:cNvPr id="59" name="tx58"/>
+            <p:cNvSpPr/>
+            <p:nvPr/>
+          </p:nvSpPr>
+          <p:spPr>
+            <a:xfrm>
+              <a:off x="5300371" y="1923477"/>
               <a:ext cx="146301" cy="109470"/>
             </a:xfrm>
             <a:prstGeom prst="rect">
@@ -5554,13 +5241,13 @@
         </p:sp>
         <p:sp>
           <p:nvSpPr>
-            <p:cNvPr id="67" name="tx66"/>
-            <p:cNvSpPr/>
-            <p:nvPr/>
-          </p:nvSpPr>
-          <p:spPr>
-            <a:xfrm>
-              <a:off x="5401239" y="2000698"/>
+            <p:cNvPr id="60" name="tx59"/>
+            <p:cNvSpPr/>
+            <p:nvPr/>
+          </p:nvSpPr>
+          <p:spPr>
+            <a:xfrm>
+              <a:off x="5300371" y="2000698"/>
               <a:ext cx="146301" cy="109470"/>
             </a:xfrm>
             <a:prstGeom prst="rect">
@@ -5600,7 +5287,7 @@
         </p:sp>
         <p:sp>
           <p:nvSpPr>
-            <p:cNvPr id="68" name="tx67"/>
+            <p:cNvPr id="61" name="tx60"/>
             <p:cNvSpPr/>
             <p:nvPr/>
           </p:nvSpPr>
@@ -5646,7 +5333,7 @@
         </p:sp>
         <p:sp>
           <p:nvSpPr>
-            <p:cNvPr id="69" name="tx68"/>
+            <p:cNvPr id="62" name="tx61"/>
             <p:cNvSpPr/>
             <p:nvPr/>
           </p:nvSpPr>
@@ -5692,7 +5379,7 @@
         </p:sp>
         <p:sp>
           <p:nvSpPr>
-            <p:cNvPr id="70" name="tx69"/>
+            <p:cNvPr id="63" name="tx62"/>
             <p:cNvSpPr/>
             <p:nvPr/>
           </p:nvSpPr>
@@ -5738,7 +5425,7 @@
         </p:sp>
         <p:sp>
           <p:nvSpPr>
-            <p:cNvPr id="71" name="tx70"/>
+            <p:cNvPr id="64" name="tx63"/>
             <p:cNvSpPr/>
             <p:nvPr/>
           </p:nvSpPr>
@@ -5784,7 +5471,7 @@
         </p:sp>
         <p:sp>
           <p:nvSpPr>
-            <p:cNvPr id="72" name="tx71"/>
+            <p:cNvPr id="65" name="tx64"/>
             <p:cNvSpPr/>
             <p:nvPr/>
           </p:nvSpPr>
@@ -5830,7 +5517,7 @@
         </p:sp>
         <p:sp>
           <p:nvSpPr>
-            <p:cNvPr id="73" name="tx72"/>
+            <p:cNvPr id="66" name="tx65"/>
             <p:cNvSpPr/>
             <p:nvPr/>
           </p:nvSpPr>
@@ -5876,7 +5563,7 @@
         </p:sp>
         <p:sp>
           <p:nvSpPr>
-            <p:cNvPr id="74" name="tx73"/>
+            <p:cNvPr id="67" name="tx66"/>
             <p:cNvSpPr/>
             <p:nvPr/>
           </p:nvSpPr>
@@ -5922,7 +5609,7 @@
         </p:sp>
         <p:sp>
           <p:nvSpPr>
-            <p:cNvPr id="75" name="tx74"/>
+            <p:cNvPr id="68" name="tx67"/>
             <p:cNvSpPr/>
             <p:nvPr/>
           </p:nvSpPr>
@@ -5968,7 +5655,7 @@
         </p:sp>
         <p:sp>
           <p:nvSpPr>
-            <p:cNvPr id="76" name="tx75"/>
+            <p:cNvPr id="69" name="tx68"/>
             <p:cNvSpPr/>
             <p:nvPr/>
           </p:nvSpPr>
@@ -6014,7 +5701,7 @@
         </p:sp>
         <p:sp>
           <p:nvSpPr>
-            <p:cNvPr id="77" name="tx76"/>
+            <p:cNvPr id="70" name="tx69"/>
             <p:cNvSpPr/>
             <p:nvPr/>
           </p:nvSpPr>
@@ -6060,7 +5747,7 @@
         </p:sp>
         <p:sp>
           <p:nvSpPr>
-            <p:cNvPr id="78" name="tx77"/>
+            <p:cNvPr id="71" name="tx70"/>
             <p:cNvSpPr/>
             <p:nvPr/>
           </p:nvSpPr>
@@ -6106,7 +5793,7 @@
         </p:sp>
         <p:sp>
           <p:nvSpPr>
-            <p:cNvPr id="79" name="pl78"/>
+            <p:cNvPr id="72" name="pl71"/>
             <p:cNvSpPr/>
             <p:nvPr/>
           </p:nvSpPr>
@@ -6146,7 +5833,7 @@
         </p:sp>
         <p:sp>
           <p:nvSpPr>
-            <p:cNvPr id="80" name="pl79"/>
+            <p:cNvPr id="73" name="pl72"/>
             <p:cNvSpPr/>
             <p:nvPr/>
           </p:nvSpPr>
@@ -6186,7 +5873,7 @@
         </p:sp>
         <p:sp>
           <p:nvSpPr>
-            <p:cNvPr id="81" name="pl80"/>
+            <p:cNvPr id="74" name="pl73"/>
             <p:cNvSpPr/>
             <p:nvPr/>
           </p:nvSpPr>
@@ -6226,7 +5913,7 @@
         </p:sp>
         <p:sp>
           <p:nvSpPr>
-            <p:cNvPr id="82" name="pl81"/>
+            <p:cNvPr id="75" name="pl74"/>
             <p:cNvSpPr/>
             <p:nvPr/>
           </p:nvSpPr>
@@ -6266,7 +5953,7 @@
         </p:sp>
         <p:sp>
           <p:nvSpPr>
-            <p:cNvPr id="83" name="pl82"/>
+            <p:cNvPr id="76" name="pl75"/>
             <p:cNvSpPr/>
             <p:nvPr/>
           </p:nvSpPr>
@@ -6306,7 +5993,7 @@
         </p:sp>
         <p:sp>
           <p:nvSpPr>
-            <p:cNvPr id="84" name="pl83"/>
+            <p:cNvPr id="77" name="pl76"/>
             <p:cNvSpPr/>
             <p:nvPr/>
           </p:nvSpPr>
@@ -6346,7 +6033,7 @@
         </p:sp>
         <p:sp>
           <p:nvSpPr>
-            <p:cNvPr id="85" name="pl84"/>
+            <p:cNvPr id="78" name="pl77"/>
             <p:cNvSpPr/>
             <p:nvPr/>
           </p:nvSpPr>
@@ -6386,7 +6073,7 @@
         </p:sp>
         <p:sp>
           <p:nvSpPr>
-            <p:cNvPr id="86" name="pl85"/>
+            <p:cNvPr id="79" name="pl78"/>
             <p:cNvSpPr/>
             <p:nvPr/>
           </p:nvSpPr>
@@ -6426,7 +6113,7 @@
         </p:sp>
         <p:sp>
           <p:nvSpPr>
-            <p:cNvPr id="87" name="pl86"/>
+            <p:cNvPr id="80" name="pl79"/>
             <p:cNvSpPr/>
             <p:nvPr/>
           </p:nvSpPr>
@@ -6466,7 +6153,7 @@
         </p:sp>
         <p:sp>
           <p:nvSpPr>
-            <p:cNvPr id="88" name="pl87"/>
+            <p:cNvPr id="81" name="pl80"/>
             <p:cNvSpPr/>
             <p:nvPr/>
           </p:nvSpPr>
@@ -6506,7 +6193,7 @@
         </p:sp>
         <p:sp>
           <p:nvSpPr>
-            <p:cNvPr id="89" name="pl88"/>
+            <p:cNvPr id="82" name="pl81"/>
             <p:cNvSpPr/>
             <p:nvPr/>
           </p:nvSpPr>
@@ -6546,13 +6233,13 @@
         </p:sp>
         <p:sp>
           <p:nvSpPr>
-            <p:cNvPr id="90" name="pl89"/>
-            <p:cNvSpPr/>
-            <p:nvPr/>
-          </p:nvSpPr>
-          <p:spPr>
-            <a:xfrm>
-              <a:off x="1719564" y="4169365"/>
+            <p:cNvPr id="83" name="pl82"/>
+            <p:cNvSpPr/>
+            <p:nvPr/>
+          </p:nvSpPr>
+          <p:spPr>
+            <a:xfrm>
+              <a:off x="1701810" y="4169365"/>
               <a:ext cx="0" cy="34794"/>
             </a:xfrm>
             <a:custGeom>
@@ -6586,13 +6273,13 @@
         </p:sp>
         <p:sp>
           <p:nvSpPr>
-            <p:cNvPr id="91" name="pl90"/>
-            <p:cNvSpPr/>
-            <p:nvPr/>
-          </p:nvSpPr>
-          <p:spPr>
-            <a:xfrm>
-              <a:off x="1997699" y="4169365"/>
+            <p:cNvPr id="84" name="pl83"/>
+            <p:cNvSpPr/>
+            <p:nvPr/>
+          </p:nvSpPr>
+          <p:spPr>
+            <a:xfrm>
+              <a:off x="2041783" y="4169365"/>
               <a:ext cx="0" cy="34794"/>
             </a:xfrm>
             <a:custGeom>
@@ -6626,13 +6313,13 @@
         </p:sp>
         <p:sp>
           <p:nvSpPr>
-            <p:cNvPr id="92" name="pl91"/>
-            <p:cNvSpPr/>
-            <p:nvPr/>
-          </p:nvSpPr>
-          <p:spPr>
-            <a:xfrm>
-              <a:off x="2275835" y="4169365"/>
+            <p:cNvPr id="85" name="pl84"/>
+            <p:cNvSpPr/>
+            <p:nvPr/>
+          </p:nvSpPr>
+          <p:spPr>
+            <a:xfrm>
+              <a:off x="2381756" y="4169365"/>
               <a:ext cx="0" cy="34794"/>
             </a:xfrm>
             <a:custGeom>
@@ -6666,13 +6353,13 @@
         </p:sp>
         <p:sp>
           <p:nvSpPr>
-            <p:cNvPr id="93" name="pl92"/>
-            <p:cNvSpPr/>
-            <p:nvPr/>
-          </p:nvSpPr>
-          <p:spPr>
-            <a:xfrm>
-              <a:off x="2553970" y="4169365"/>
+            <p:cNvPr id="86" name="pl85"/>
+            <p:cNvSpPr/>
+            <p:nvPr/>
+          </p:nvSpPr>
+          <p:spPr>
+            <a:xfrm>
+              <a:off x="2721730" y="4169365"/>
               <a:ext cx="0" cy="34794"/>
             </a:xfrm>
             <a:custGeom>
@@ -6706,13 +6393,13 @@
         </p:sp>
         <p:sp>
           <p:nvSpPr>
-            <p:cNvPr id="94" name="pl93"/>
-            <p:cNvSpPr/>
-            <p:nvPr/>
-          </p:nvSpPr>
-          <p:spPr>
-            <a:xfrm>
-              <a:off x="2832105" y="4169365"/>
+            <p:cNvPr id="87" name="pl86"/>
+            <p:cNvSpPr/>
+            <p:nvPr/>
+          </p:nvSpPr>
+          <p:spPr>
+            <a:xfrm>
+              <a:off x="3061703" y="4169365"/>
               <a:ext cx="0" cy="34794"/>
             </a:xfrm>
             <a:custGeom>
@@ -6746,13 +6433,13 @@
         </p:sp>
         <p:sp>
           <p:nvSpPr>
-            <p:cNvPr id="95" name="pl94"/>
-            <p:cNvSpPr/>
-            <p:nvPr/>
-          </p:nvSpPr>
-          <p:spPr>
-            <a:xfrm>
-              <a:off x="3110240" y="4169365"/>
+            <p:cNvPr id="88" name="pl87"/>
+            <p:cNvSpPr/>
+            <p:nvPr/>
+          </p:nvSpPr>
+          <p:spPr>
+            <a:xfrm>
+              <a:off x="3401677" y="4169365"/>
               <a:ext cx="0" cy="34794"/>
             </a:xfrm>
             <a:custGeom>
@@ -6786,13 +6473,13 @@
         </p:sp>
         <p:sp>
           <p:nvSpPr>
-            <p:cNvPr id="96" name="pl95"/>
-            <p:cNvSpPr/>
-            <p:nvPr/>
-          </p:nvSpPr>
-          <p:spPr>
-            <a:xfrm>
-              <a:off x="3388375" y="4169365"/>
+            <p:cNvPr id="89" name="pl88"/>
+            <p:cNvSpPr/>
+            <p:nvPr/>
+          </p:nvSpPr>
+          <p:spPr>
+            <a:xfrm>
+              <a:off x="3741650" y="4169365"/>
               <a:ext cx="0" cy="34794"/>
             </a:xfrm>
             <a:custGeom>
@@ -6826,13 +6513,13 @@
         </p:sp>
         <p:sp>
           <p:nvSpPr>
-            <p:cNvPr id="97" name="pl96"/>
-            <p:cNvSpPr/>
-            <p:nvPr/>
-          </p:nvSpPr>
-          <p:spPr>
-            <a:xfrm>
-              <a:off x="3666511" y="4169365"/>
+            <p:cNvPr id="90" name="pl89"/>
+            <p:cNvSpPr/>
+            <p:nvPr/>
+          </p:nvSpPr>
+          <p:spPr>
+            <a:xfrm>
+              <a:off x="4081624" y="4169365"/>
               <a:ext cx="0" cy="34794"/>
             </a:xfrm>
             <a:custGeom>
@@ -6866,13 +6553,13 @@
         </p:sp>
         <p:sp>
           <p:nvSpPr>
-            <p:cNvPr id="98" name="pl97"/>
-            <p:cNvSpPr/>
-            <p:nvPr/>
-          </p:nvSpPr>
-          <p:spPr>
-            <a:xfrm>
-              <a:off x="3944646" y="4169365"/>
+            <p:cNvPr id="91" name="pl90"/>
+            <p:cNvSpPr/>
+            <p:nvPr/>
+          </p:nvSpPr>
+          <p:spPr>
+            <a:xfrm>
+              <a:off x="4421597" y="4169365"/>
               <a:ext cx="0" cy="34794"/>
             </a:xfrm>
             <a:custGeom>
@@ -6906,13 +6593,13 @@
         </p:sp>
         <p:sp>
           <p:nvSpPr>
-            <p:cNvPr id="99" name="pl98"/>
-            <p:cNvSpPr/>
-            <p:nvPr/>
-          </p:nvSpPr>
-          <p:spPr>
-            <a:xfrm>
-              <a:off x="4222781" y="4169365"/>
+            <p:cNvPr id="92" name="pl91"/>
+            <p:cNvSpPr/>
+            <p:nvPr/>
+          </p:nvSpPr>
+          <p:spPr>
+            <a:xfrm>
+              <a:off x="4761570" y="4169365"/>
               <a:ext cx="0" cy="34794"/>
             </a:xfrm>
             <a:custGeom>
@@ -6946,13 +6633,13 @@
         </p:sp>
         <p:sp>
           <p:nvSpPr>
-            <p:cNvPr id="100" name="pl99"/>
-            <p:cNvSpPr/>
-            <p:nvPr/>
-          </p:nvSpPr>
-          <p:spPr>
-            <a:xfrm>
-              <a:off x="4500916" y="4169365"/>
+            <p:cNvPr id="93" name="pl92"/>
+            <p:cNvSpPr/>
+            <p:nvPr/>
+          </p:nvSpPr>
+          <p:spPr>
+            <a:xfrm>
+              <a:off x="5101544" y="4169365"/>
               <a:ext cx="0" cy="34794"/>
             </a:xfrm>
             <a:custGeom>
@@ -6986,133 +6673,13 @@
         </p:sp>
         <p:sp>
           <p:nvSpPr>
-            <p:cNvPr id="101" name="pl100"/>
-            <p:cNvSpPr/>
-            <p:nvPr/>
-          </p:nvSpPr>
-          <p:spPr>
-            <a:xfrm>
-              <a:off x="4779052" y="4169365"/>
-              <a:ext cx="0" cy="34794"/>
-            </a:xfrm>
-            <a:custGeom>
-              <a:avLst/>
-              <a:pathLst>
-                <a:path w="0" h="34794">
-                  <a:moveTo>
-                    <a:pt x="0" y="34794"/>
-                  </a:moveTo>
-                  <a:lnTo>
-                    <a:pt x="0" y="0"/>
-                  </a:lnTo>
-                </a:path>
-              </a:pathLst>
-            </a:custGeom>
-            <a:ln w="13550" cap="flat">
-              <a:solidFill>
-                <a:srgbClr val="000000">
-                  <a:alpha val="100000"/>
-                </a:srgbClr>
-              </a:solidFill>
-              <a:prstDash val="solid"/>
-              <a:round/>
-            </a:ln>
-          </p:spPr>
-          <p:txBody>
-            <a:bodyPr/>
-            <a:lstStyle/>
-            <a:p/>
-          </p:txBody>
-        </p:sp>
-        <p:sp>
-          <p:nvSpPr>
-            <p:cNvPr id="102" name="pl101"/>
-            <p:cNvSpPr/>
-            <p:nvPr/>
-          </p:nvSpPr>
-          <p:spPr>
-            <a:xfrm>
-              <a:off x="5057187" y="4169365"/>
-              <a:ext cx="0" cy="34794"/>
-            </a:xfrm>
-            <a:custGeom>
-              <a:avLst/>
-              <a:pathLst>
-                <a:path w="0" h="34794">
-                  <a:moveTo>
-                    <a:pt x="0" y="34794"/>
-                  </a:moveTo>
-                  <a:lnTo>
-                    <a:pt x="0" y="0"/>
-                  </a:lnTo>
-                </a:path>
-              </a:pathLst>
-            </a:custGeom>
-            <a:ln w="13550" cap="flat">
-              <a:solidFill>
-                <a:srgbClr val="000000">
-                  <a:alpha val="100000"/>
-                </a:srgbClr>
-              </a:solidFill>
-              <a:prstDash val="solid"/>
-              <a:round/>
-            </a:ln>
-          </p:spPr>
-          <p:txBody>
-            <a:bodyPr/>
-            <a:lstStyle/>
-            <a:p/>
-          </p:txBody>
-        </p:sp>
-        <p:sp>
-          <p:nvSpPr>
-            <p:cNvPr id="103" name="pl102"/>
-            <p:cNvSpPr/>
-            <p:nvPr/>
-          </p:nvSpPr>
-          <p:spPr>
-            <a:xfrm>
-              <a:off x="5335322" y="4169365"/>
-              <a:ext cx="0" cy="34794"/>
-            </a:xfrm>
-            <a:custGeom>
-              <a:avLst/>
-              <a:pathLst>
-                <a:path w="0" h="34794">
-                  <a:moveTo>
-                    <a:pt x="0" y="34794"/>
-                  </a:moveTo>
-                  <a:lnTo>
-                    <a:pt x="0" y="0"/>
-                  </a:lnTo>
-                </a:path>
-              </a:pathLst>
-            </a:custGeom>
-            <a:ln w="13550" cap="flat">
-              <a:solidFill>
-                <a:srgbClr val="000000">
-                  <a:alpha val="100000"/>
-                </a:srgbClr>
-              </a:solidFill>
-              <a:prstDash val="solid"/>
-              <a:round/>
-            </a:ln>
-          </p:spPr>
-          <p:txBody>
-            <a:bodyPr/>
-            <a:lstStyle/>
-            <a:p/>
-          </p:txBody>
-        </p:sp>
-        <p:sp>
-          <p:nvSpPr>
-            <p:cNvPr id="104" name="tx103"/>
-            <p:cNvSpPr/>
-            <p:nvPr/>
-          </p:nvSpPr>
-          <p:spPr>
-            <a:xfrm>
-              <a:off x="1684012" y="4228939"/>
+            <p:cNvPr id="94" name="tx93"/>
+            <p:cNvSpPr/>
+            <p:nvPr/>
+          </p:nvSpPr>
+          <p:spPr>
+            <a:xfrm>
+              <a:off x="1666257" y="4228939"/>
               <a:ext cx="71105" cy="84529"/>
             </a:xfrm>
             <a:prstGeom prst="rect">
@@ -7152,14 +6719,14 @@
         </p:sp>
         <p:sp>
           <p:nvSpPr>
-            <p:cNvPr id="105" name="tx104"/>
-            <p:cNvSpPr/>
-            <p:nvPr/>
-          </p:nvSpPr>
-          <p:spPr>
-            <a:xfrm>
-              <a:off x="1962147" y="4231995"/>
-              <a:ext cx="71105" cy="81473"/>
+            <p:cNvPr id="95" name="tx94"/>
+            <p:cNvSpPr/>
+            <p:nvPr/>
+          </p:nvSpPr>
+          <p:spPr>
+            <a:xfrm>
+              <a:off x="2006230" y="4230412"/>
+              <a:ext cx="71105" cy="83056"/>
             </a:xfrm>
             <a:prstGeom prst="rect">
               <a:avLst/>
@@ -7191,21 +6758,21 @@
                   <a:latin typeface="DejaVu Sans"/>
                   <a:cs typeface="DejaVu Sans"/>
                 </a:rPr>
-                <a:t>4</a:t>
+                <a:t>5</a:t>
               </a:r>
             </a:p>
           </p:txBody>
         </p:sp>
         <p:sp>
           <p:nvSpPr>
-            <p:cNvPr id="106" name="tx105"/>
-            <p:cNvSpPr/>
-            <p:nvPr/>
-          </p:nvSpPr>
-          <p:spPr>
-            <a:xfrm>
-              <a:off x="2240282" y="4228939"/>
-              <a:ext cx="71105" cy="84529"/>
+            <p:cNvPr id="96" name="tx95"/>
+            <p:cNvSpPr/>
+            <p:nvPr/>
+          </p:nvSpPr>
+          <p:spPr>
+            <a:xfrm>
+              <a:off x="2310651" y="4228939"/>
+              <a:ext cx="142210" cy="84529"/>
             </a:xfrm>
             <a:prstGeom prst="rect">
               <a:avLst/>
@@ -7237,21 +6804,21 @@
                   <a:latin typeface="DejaVu Sans"/>
                   <a:cs typeface="DejaVu Sans"/>
                 </a:rPr>
-                <a:t>8</a:t>
+                <a:t>10</a:t>
               </a:r>
             </a:p>
           </p:txBody>
         </p:sp>
         <p:sp>
           <p:nvSpPr>
-            <p:cNvPr id="107" name="tx106"/>
-            <p:cNvSpPr/>
-            <p:nvPr/>
-          </p:nvSpPr>
-          <p:spPr>
-            <a:xfrm>
-              <a:off x="2482865" y="4230522"/>
-              <a:ext cx="142210" cy="82946"/>
+            <p:cNvPr id="97" name="tx96"/>
+            <p:cNvSpPr/>
+            <p:nvPr/>
+          </p:nvSpPr>
+          <p:spPr>
+            <a:xfrm>
+              <a:off x="2650625" y="4230412"/>
+              <a:ext cx="142210" cy="83056"/>
             </a:xfrm>
             <a:prstGeom prst="rect">
               <a:avLst/>
@@ -7283,66 +6850,20 @@
                   <a:latin typeface="DejaVu Sans"/>
                   <a:cs typeface="DejaVu Sans"/>
                 </a:rPr>
-                <a:t>12</a:t>
+                <a:t>15</a:t>
               </a:r>
             </a:p>
           </p:txBody>
         </p:sp>
         <p:sp>
           <p:nvSpPr>
-            <p:cNvPr id="108" name="tx107"/>
-            <p:cNvSpPr/>
-            <p:nvPr/>
-          </p:nvSpPr>
-          <p:spPr>
-            <a:xfrm>
-              <a:off x="2761000" y="4228939"/>
-              <a:ext cx="142210" cy="84529"/>
-            </a:xfrm>
-            <a:prstGeom prst="rect">
-              <a:avLst/>
-            </a:prstGeom>
-            <a:noFill/>
-          </p:spPr>
-          <p:txBody>
-            <a:bodyPr lIns="0" rIns="0" tIns="0" bIns="0" anchorCtr="1" anchor="ctr" wrap="none"/>
-            <a:lstStyle/>
-            <a:p>
-              <a:pPr algn="l" marL="0" marR="0" indent="0">
-                <a:lnSpc>
-                  <a:spcPts val="880"/>
-                </a:lnSpc>
-                <a:spcBef>
-                  <a:spcPts val="0"/>
-                </a:spcBef>
-                <a:spcAft>
-                  <a:spcPts val="0"/>
-                </a:spcAft>
-              </a:pPr>
-              <a:r>
-                <a:rPr sz="880">
-                  <a:solidFill>
-                    <a:srgbClr val="4D4D4D">
-                      <a:alpha val="100000"/>
-                    </a:srgbClr>
-                  </a:solidFill>
-                  <a:latin typeface="DejaVu Sans"/>
-                  <a:cs typeface="DejaVu Sans"/>
-                </a:rPr>
-                <a:t>16</a:t>
-              </a:r>
-            </a:p>
-          </p:txBody>
-        </p:sp>
-        <p:sp>
-          <p:nvSpPr>
-            <p:cNvPr id="109" name="tx108"/>
-            <p:cNvSpPr/>
-            <p:nvPr/>
-          </p:nvSpPr>
-          <p:spPr>
-            <a:xfrm>
-              <a:off x="3039135" y="4228939"/>
+            <p:cNvPr id="98" name="tx97"/>
+            <p:cNvSpPr/>
+            <p:nvPr/>
+          </p:nvSpPr>
+          <p:spPr>
+            <a:xfrm>
+              <a:off x="2990598" y="4228939"/>
               <a:ext cx="142210" cy="84529"/>
             </a:xfrm>
             <a:prstGeom prst="rect">
@@ -7382,14 +6903,14 @@
         </p:sp>
         <p:sp>
           <p:nvSpPr>
-            <p:cNvPr id="110" name="tx109"/>
-            <p:cNvSpPr/>
-            <p:nvPr/>
-          </p:nvSpPr>
-          <p:spPr>
-            <a:xfrm>
-              <a:off x="3317270" y="4230522"/>
-              <a:ext cx="142210" cy="82946"/>
+            <p:cNvPr id="99" name="tx98"/>
+            <p:cNvSpPr/>
+            <p:nvPr/>
+          </p:nvSpPr>
+          <p:spPr>
+            <a:xfrm>
+              <a:off x="3330572" y="4228939"/>
+              <a:ext cx="142210" cy="84529"/>
             </a:xfrm>
             <a:prstGeom prst="rect">
               <a:avLst/>
@@ -7421,20 +6942,20 @@
                   <a:latin typeface="DejaVu Sans"/>
                   <a:cs typeface="DejaVu Sans"/>
                 </a:rPr>
-                <a:t>24</a:t>
+                <a:t>25</a:t>
               </a:r>
             </a:p>
           </p:txBody>
         </p:sp>
         <p:sp>
           <p:nvSpPr>
-            <p:cNvPr id="111" name="tx110"/>
-            <p:cNvSpPr/>
-            <p:nvPr/>
-          </p:nvSpPr>
-          <p:spPr>
-            <a:xfrm>
-              <a:off x="3595406" y="4228939"/>
+            <p:cNvPr id="100" name="tx99"/>
+            <p:cNvSpPr/>
+            <p:nvPr/>
+          </p:nvSpPr>
+          <p:spPr>
+            <a:xfrm>
+              <a:off x="3670545" y="4228939"/>
               <a:ext cx="142210" cy="84529"/>
             </a:xfrm>
             <a:prstGeom prst="rect">
@@ -7467,20 +6988,20 @@
                   <a:latin typeface="DejaVu Sans"/>
                   <a:cs typeface="DejaVu Sans"/>
                 </a:rPr>
-                <a:t>28</a:t>
+                <a:t>30</a:t>
               </a:r>
             </a:p>
           </p:txBody>
         </p:sp>
         <p:sp>
           <p:nvSpPr>
-            <p:cNvPr id="112" name="tx111"/>
-            <p:cNvSpPr/>
-            <p:nvPr/>
-          </p:nvSpPr>
-          <p:spPr>
-            <a:xfrm>
-              <a:off x="3873541" y="4228939"/>
+            <p:cNvPr id="101" name="tx100"/>
+            <p:cNvSpPr/>
+            <p:nvPr/>
+          </p:nvSpPr>
+          <p:spPr>
+            <a:xfrm>
+              <a:off x="4010518" y="4228939"/>
               <a:ext cx="142210" cy="84529"/>
             </a:xfrm>
             <a:prstGeom prst="rect">
@@ -7513,66 +7034,20 @@
                   <a:latin typeface="DejaVu Sans"/>
                   <a:cs typeface="DejaVu Sans"/>
                 </a:rPr>
-                <a:t>32</a:t>
+                <a:t>35</a:t>
               </a:r>
             </a:p>
           </p:txBody>
         </p:sp>
         <p:sp>
           <p:nvSpPr>
-            <p:cNvPr id="113" name="tx112"/>
-            <p:cNvSpPr/>
-            <p:nvPr/>
-          </p:nvSpPr>
-          <p:spPr>
-            <a:xfrm>
-              <a:off x="4151676" y="4228939"/>
-              <a:ext cx="142210" cy="84529"/>
-            </a:xfrm>
-            <a:prstGeom prst="rect">
-              <a:avLst/>
-            </a:prstGeom>
-            <a:noFill/>
-          </p:spPr>
-          <p:txBody>
-            <a:bodyPr lIns="0" rIns="0" tIns="0" bIns="0" anchorCtr="1" anchor="ctr" wrap="none"/>
-            <a:lstStyle/>
-            <a:p>
-              <a:pPr algn="l" marL="0" marR="0" indent="0">
-                <a:lnSpc>
-                  <a:spcPts val="880"/>
-                </a:lnSpc>
-                <a:spcBef>
-                  <a:spcPts val="0"/>
-                </a:spcBef>
-                <a:spcAft>
-                  <a:spcPts val="0"/>
-                </a:spcAft>
-              </a:pPr>
-              <a:r>
-                <a:rPr sz="880">
-                  <a:solidFill>
-                    <a:srgbClr val="4D4D4D">
-                      <a:alpha val="100000"/>
-                    </a:srgbClr>
-                  </a:solidFill>
-                  <a:latin typeface="DejaVu Sans"/>
-                  <a:cs typeface="DejaVu Sans"/>
-                </a:rPr>
-                <a:t>36</a:t>
-              </a:r>
-            </a:p>
-          </p:txBody>
-        </p:sp>
-        <p:sp>
-          <p:nvSpPr>
-            <p:cNvPr id="114" name="tx113"/>
-            <p:cNvSpPr/>
-            <p:nvPr/>
-          </p:nvSpPr>
-          <p:spPr>
-            <a:xfrm>
-              <a:off x="4429811" y="4228939"/>
+            <p:cNvPr id="102" name="tx101"/>
+            <p:cNvSpPr/>
+            <p:nvPr/>
+          </p:nvSpPr>
+          <p:spPr>
+            <a:xfrm>
+              <a:off x="4350492" y="4228939"/>
               <a:ext cx="142210" cy="84529"/>
             </a:xfrm>
             <a:prstGeom prst="rect">
@@ -7612,14 +7087,14 @@
         </p:sp>
         <p:sp>
           <p:nvSpPr>
-            <p:cNvPr id="115" name="tx114"/>
-            <p:cNvSpPr/>
-            <p:nvPr/>
-          </p:nvSpPr>
-          <p:spPr>
-            <a:xfrm>
-              <a:off x="4707946" y="4231995"/>
-              <a:ext cx="142210" cy="81473"/>
+            <p:cNvPr id="103" name="tx102"/>
+            <p:cNvSpPr/>
+            <p:nvPr/>
+          </p:nvSpPr>
+          <p:spPr>
+            <a:xfrm>
+              <a:off x="4690465" y="4230412"/>
+              <a:ext cx="142210" cy="83056"/>
             </a:xfrm>
             <a:prstGeom prst="rect">
               <a:avLst/>
@@ -7651,20 +7126,20 @@
                   <a:latin typeface="DejaVu Sans"/>
                   <a:cs typeface="DejaVu Sans"/>
                 </a:rPr>
-                <a:t>44</a:t>
+                <a:t>45</a:t>
               </a:r>
             </a:p>
           </p:txBody>
         </p:sp>
         <p:sp>
           <p:nvSpPr>
-            <p:cNvPr id="116" name="tx115"/>
-            <p:cNvSpPr/>
-            <p:nvPr/>
-          </p:nvSpPr>
-          <p:spPr>
-            <a:xfrm>
-              <a:off x="4986082" y="4228939"/>
+            <p:cNvPr id="104" name="tx103"/>
+            <p:cNvSpPr/>
+            <p:nvPr/>
+          </p:nvSpPr>
+          <p:spPr>
+            <a:xfrm>
+              <a:off x="5030439" y="4228939"/>
               <a:ext cx="142210" cy="84529"/>
             </a:xfrm>
             <a:prstGeom prst="rect">
@@ -7697,66 +7172,20 @@
                   <a:latin typeface="DejaVu Sans"/>
                   <a:cs typeface="DejaVu Sans"/>
                 </a:rPr>
-                <a:t>48</a:t>
+                <a:t>50</a:t>
               </a:r>
             </a:p>
           </p:txBody>
         </p:sp>
         <p:sp>
           <p:nvSpPr>
-            <p:cNvPr id="117" name="tx116"/>
-            <p:cNvSpPr/>
-            <p:nvPr/>
-          </p:nvSpPr>
-          <p:spPr>
-            <a:xfrm>
-              <a:off x="5264217" y="4228939"/>
-              <a:ext cx="142210" cy="84529"/>
-            </a:xfrm>
-            <a:prstGeom prst="rect">
-              <a:avLst/>
-            </a:prstGeom>
-            <a:noFill/>
-          </p:spPr>
-          <p:txBody>
-            <a:bodyPr lIns="0" rIns="0" tIns="0" bIns="0" anchorCtr="1" anchor="ctr" wrap="none"/>
-            <a:lstStyle/>
-            <a:p>
-              <a:pPr algn="l" marL="0" marR="0" indent="0">
-                <a:lnSpc>
-                  <a:spcPts val="880"/>
-                </a:lnSpc>
-                <a:spcBef>
-                  <a:spcPts val="0"/>
-                </a:spcBef>
-                <a:spcAft>
-                  <a:spcPts val="0"/>
-                </a:spcAft>
-              </a:pPr>
-              <a:r>
-                <a:rPr sz="880">
-                  <a:solidFill>
-                    <a:srgbClr val="4D4D4D">
-                      <a:alpha val="100000"/>
-                    </a:srgbClr>
-                  </a:solidFill>
-                  <a:latin typeface="DejaVu Sans"/>
-                  <a:cs typeface="DejaVu Sans"/>
-                </a:rPr>
-                <a:t>52</a:t>
-              </a:r>
-            </a:p>
-          </p:txBody>
-        </p:sp>
-        <p:sp>
-          <p:nvSpPr>
-            <p:cNvPr id="118" name="tx117"/>
-            <p:cNvSpPr/>
-            <p:nvPr/>
-          </p:nvSpPr>
-          <p:spPr>
-            <a:xfrm>
-              <a:off x="3467509" y="4371510"/>
+            <p:cNvPr id="105" name="tx104"/>
+            <p:cNvSpPr/>
+            <p:nvPr/>
+          </p:nvSpPr>
+          <p:spPr>
+            <a:xfrm>
+              <a:off x="3272209" y="4371510"/>
               <a:ext cx="258936" cy="101841"/>
             </a:xfrm>
             <a:prstGeom prst="rect">
@@ -7796,7 +7225,7 @@
         </p:sp>
         <p:sp>
           <p:nvSpPr>
-            <p:cNvPr id="119" name="tx118"/>
+            <p:cNvPr id="106" name="tx105"/>
             <p:cNvSpPr/>
             <p:nvPr/>
           </p:nvSpPr>
@@ -7842,14 +7271,14 @@
         </p:sp>
         <p:sp>
           <p:nvSpPr>
-            <p:cNvPr id="120" name="rc119"/>
-            <p:cNvSpPr/>
-            <p:nvPr/>
-          </p:nvSpPr>
-          <p:spPr>
-            <a:xfrm>
-              <a:off x="5801309" y="1967931"/>
-              <a:ext cx="529901" cy="1217491"/>
+            <p:cNvPr id="107" name="rc106"/>
+            <p:cNvSpPr/>
+            <p:nvPr/>
+          </p:nvSpPr>
+          <p:spPr>
+            <a:xfrm>
+              <a:off x="5410709" y="1967931"/>
+              <a:ext cx="920501" cy="1217491"/>
             </a:xfrm>
             <a:prstGeom prst="rect">
               <a:avLst/>
@@ -7868,13 +7297,13 @@
         </p:sp>
         <p:sp>
           <p:nvSpPr>
-            <p:cNvPr id="121" name="tx120"/>
-            <p:cNvSpPr/>
-            <p:nvPr/>
-          </p:nvSpPr>
-          <p:spPr>
-            <a:xfrm>
-              <a:off x="5870898" y="2052049"/>
+            <p:cNvPr id="108" name="tx107"/>
+            <p:cNvSpPr/>
+            <p:nvPr/>
+          </p:nvSpPr>
+          <p:spPr>
+            <a:xfrm>
+              <a:off x="5480298" y="2052049"/>
               <a:ext cx="390723" cy="101841"/>
             </a:xfrm>
             <a:prstGeom prst="rect">
@@ -7914,13 +7343,13 @@
         </p:sp>
         <p:sp>
           <p:nvSpPr>
-            <p:cNvPr id="122" name="rc121"/>
-            <p:cNvSpPr/>
-            <p:nvPr/>
-          </p:nvSpPr>
-          <p:spPr>
-            <a:xfrm>
-              <a:off x="5870898" y="2238009"/>
+            <p:cNvPr id="109" name="rc108"/>
+            <p:cNvSpPr/>
+            <p:nvPr/>
+          </p:nvSpPr>
+          <p:spPr>
+            <a:xfrm>
+              <a:off x="5480298" y="2238009"/>
               <a:ext cx="219455" cy="219456"/>
             </a:xfrm>
             <a:prstGeom prst="rect">
@@ -7940,13 +7369,13 @@
         </p:sp>
         <p:sp>
           <p:nvSpPr>
-            <p:cNvPr id="123" name="pl122"/>
-            <p:cNvSpPr/>
-            <p:nvPr/>
-          </p:nvSpPr>
-          <p:spPr>
-            <a:xfrm>
-              <a:off x="5892844" y="2347737"/>
+            <p:cNvPr id="110" name="pl109"/>
+            <p:cNvSpPr/>
+            <p:nvPr/>
+          </p:nvSpPr>
+          <p:spPr>
+            <a:xfrm>
+              <a:off x="5502243" y="2347737"/>
               <a:ext cx="175564" cy="0"/>
             </a:xfrm>
             <a:custGeom>
@@ -7980,13 +7409,13 @@
         </p:sp>
         <p:sp>
           <p:nvSpPr>
-            <p:cNvPr id="124" name="tx123"/>
-            <p:cNvSpPr/>
-            <p:nvPr/>
-          </p:nvSpPr>
-          <p:spPr>
-            <a:xfrm>
-              <a:off x="5907475" y="2293002"/>
+            <p:cNvPr id="111" name="tx110"/>
+            <p:cNvSpPr/>
+            <p:nvPr/>
+          </p:nvSpPr>
+          <p:spPr>
+            <a:xfrm>
+              <a:off x="5516875" y="2293002"/>
               <a:ext cx="146301" cy="109470"/>
             </a:xfrm>
             <a:prstGeom prst="rect">
@@ -8026,13 +7455,13 @@
         </p:sp>
         <p:sp>
           <p:nvSpPr>
-            <p:cNvPr id="125" name="rc124"/>
-            <p:cNvSpPr/>
-            <p:nvPr/>
-          </p:nvSpPr>
-          <p:spPr>
-            <a:xfrm>
-              <a:off x="5870898" y="2457465"/>
+            <p:cNvPr id="112" name="rc111"/>
+            <p:cNvSpPr/>
+            <p:nvPr/>
+          </p:nvSpPr>
+          <p:spPr>
+            <a:xfrm>
+              <a:off x="5480298" y="2457465"/>
               <a:ext cx="219455" cy="219456"/>
             </a:xfrm>
             <a:prstGeom prst="rect">
@@ -8052,13 +7481,13 @@
         </p:sp>
         <p:sp>
           <p:nvSpPr>
-            <p:cNvPr id="126" name="pl125"/>
-            <p:cNvSpPr/>
-            <p:nvPr/>
-          </p:nvSpPr>
-          <p:spPr>
-            <a:xfrm>
-              <a:off x="5892844" y="2567193"/>
+            <p:cNvPr id="113" name="pl112"/>
+            <p:cNvSpPr/>
+            <p:nvPr/>
+          </p:nvSpPr>
+          <p:spPr>
+            <a:xfrm>
+              <a:off x="5502243" y="2567193"/>
               <a:ext cx="175564" cy="0"/>
             </a:xfrm>
             <a:custGeom>
@@ -8092,13 +7521,13 @@
         </p:sp>
         <p:sp>
           <p:nvSpPr>
-            <p:cNvPr id="127" name="tx126"/>
-            <p:cNvSpPr/>
-            <p:nvPr/>
-          </p:nvSpPr>
-          <p:spPr>
-            <a:xfrm>
-              <a:off x="5907475" y="2512458"/>
+            <p:cNvPr id="114" name="tx113"/>
+            <p:cNvSpPr/>
+            <p:nvPr/>
+          </p:nvSpPr>
+          <p:spPr>
+            <a:xfrm>
+              <a:off x="5516875" y="2512458"/>
               <a:ext cx="146301" cy="109470"/>
             </a:xfrm>
             <a:prstGeom prst="rect">
@@ -8138,13 +7567,13 @@
         </p:sp>
         <p:sp>
           <p:nvSpPr>
-            <p:cNvPr id="128" name="rc127"/>
-            <p:cNvSpPr/>
-            <p:nvPr/>
-          </p:nvSpPr>
-          <p:spPr>
-            <a:xfrm>
-              <a:off x="5870898" y="2676921"/>
+            <p:cNvPr id="115" name="rc114"/>
+            <p:cNvSpPr/>
+            <p:nvPr/>
+          </p:nvSpPr>
+          <p:spPr>
+            <a:xfrm>
+              <a:off x="5480298" y="2676921"/>
               <a:ext cx="219455" cy="219456"/>
             </a:xfrm>
             <a:prstGeom prst="rect">
@@ -8164,13 +7593,13 @@
         </p:sp>
         <p:sp>
           <p:nvSpPr>
-            <p:cNvPr id="129" name="pl128"/>
-            <p:cNvSpPr/>
-            <p:nvPr/>
-          </p:nvSpPr>
-          <p:spPr>
-            <a:xfrm>
-              <a:off x="5892844" y="2786649"/>
+            <p:cNvPr id="116" name="pl115"/>
+            <p:cNvSpPr/>
+            <p:nvPr/>
+          </p:nvSpPr>
+          <p:spPr>
+            <a:xfrm>
+              <a:off x="5502243" y="2786649"/>
               <a:ext cx="175564" cy="0"/>
             </a:xfrm>
             <a:custGeom>
@@ -8204,13 +7633,13 @@
         </p:sp>
         <p:sp>
           <p:nvSpPr>
-            <p:cNvPr id="130" name="tx129"/>
-            <p:cNvSpPr/>
-            <p:nvPr/>
-          </p:nvSpPr>
-          <p:spPr>
-            <a:xfrm>
-              <a:off x="5907475" y="2731914"/>
+            <p:cNvPr id="117" name="tx116"/>
+            <p:cNvSpPr/>
+            <p:nvPr/>
+          </p:nvSpPr>
+          <p:spPr>
+            <a:xfrm>
+              <a:off x="5516875" y="2731914"/>
               <a:ext cx="146301" cy="109470"/>
             </a:xfrm>
             <a:prstGeom prst="rect">
@@ -8250,13 +7679,13 @@
         </p:sp>
         <p:sp>
           <p:nvSpPr>
-            <p:cNvPr id="131" name="rc130"/>
-            <p:cNvSpPr/>
-            <p:nvPr/>
-          </p:nvSpPr>
-          <p:spPr>
-            <a:xfrm>
-              <a:off x="5870898" y="2896377"/>
+            <p:cNvPr id="118" name="rc117"/>
+            <p:cNvSpPr/>
+            <p:nvPr/>
+          </p:nvSpPr>
+          <p:spPr>
+            <a:xfrm>
+              <a:off x="5480298" y="2896377"/>
               <a:ext cx="219455" cy="219456"/>
             </a:xfrm>
             <a:prstGeom prst="rect">
@@ -8276,13 +7705,13 @@
         </p:sp>
         <p:sp>
           <p:nvSpPr>
-            <p:cNvPr id="132" name="pl131"/>
-            <p:cNvSpPr/>
-            <p:nvPr/>
-          </p:nvSpPr>
-          <p:spPr>
-            <a:xfrm>
-              <a:off x="5892844" y="3006105"/>
+            <p:cNvPr id="119" name="pl118"/>
+            <p:cNvSpPr/>
+            <p:nvPr/>
+          </p:nvSpPr>
+          <p:spPr>
+            <a:xfrm>
+              <a:off x="5502243" y="3006105"/>
               <a:ext cx="175564" cy="0"/>
             </a:xfrm>
             <a:custGeom>
@@ -8316,13 +7745,13 @@
         </p:sp>
         <p:sp>
           <p:nvSpPr>
-            <p:cNvPr id="133" name="tx132"/>
-            <p:cNvSpPr/>
-            <p:nvPr/>
-          </p:nvSpPr>
-          <p:spPr>
-            <a:xfrm>
-              <a:off x="5907475" y="2951370"/>
+            <p:cNvPr id="120" name="tx119"/>
+            <p:cNvSpPr/>
+            <p:nvPr/>
+          </p:nvSpPr>
+          <p:spPr>
+            <a:xfrm>
+              <a:off x="5516875" y="2951370"/>
               <a:ext cx="146301" cy="109470"/>
             </a:xfrm>
             <a:prstGeom prst="rect">
@@ -8362,14 +7791,14 @@
         </p:sp>
         <p:sp>
           <p:nvSpPr>
-            <p:cNvPr id="134" name="tx133"/>
-            <p:cNvSpPr/>
-            <p:nvPr/>
-          </p:nvSpPr>
-          <p:spPr>
-            <a:xfrm>
-              <a:off x="6159943" y="2307001"/>
-              <a:ext cx="76453" cy="81473"/>
+            <p:cNvPr id="121" name="tx120"/>
+            <p:cNvSpPr/>
+            <p:nvPr/>
+          </p:nvSpPr>
+          <p:spPr>
+            <a:xfrm>
+              <a:off x="5769343" y="2307001"/>
+              <a:ext cx="482674" cy="81473"/>
             </a:xfrm>
             <a:prstGeom prst="rect">
               <a:avLst/>
@@ -8401,21 +7830,21 @@
                   <a:latin typeface="DejaVu Sans"/>
                   <a:cs typeface="DejaVu Sans"/>
                 </a:rPr>
-                <a:t>A</a:t>
+                <a:t>Trt.ID=A</a:t>
               </a:r>
             </a:p>
           </p:txBody>
         </p:sp>
         <p:sp>
           <p:nvSpPr>
-            <p:cNvPr id="135" name="tx134"/>
-            <p:cNvSpPr/>
-            <p:nvPr/>
-          </p:nvSpPr>
-          <p:spPr>
-            <a:xfrm>
-              <a:off x="6159943" y="2526457"/>
-              <a:ext cx="76671" cy="81473"/>
+            <p:cNvPr id="122" name="tx121"/>
+            <p:cNvSpPr/>
+            <p:nvPr/>
+          </p:nvSpPr>
+          <p:spPr>
+            <a:xfrm>
+              <a:off x="5769343" y="2526457"/>
+              <a:ext cx="482892" cy="81473"/>
             </a:xfrm>
             <a:prstGeom prst="rect">
               <a:avLst/>
@@ -8447,21 +7876,21 @@
                   <a:latin typeface="DejaVu Sans"/>
                   <a:cs typeface="DejaVu Sans"/>
                 </a:rPr>
-                <a:t>B</a:t>
+                <a:t>Trt.ID=B</a:t>
               </a:r>
             </a:p>
           </p:txBody>
         </p:sp>
         <p:sp>
           <p:nvSpPr>
-            <p:cNvPr id="136" name="tx135"/>
-            <p:cNvSpPr/>
-            <p:nvPr/>
-          </p:nvSpPr>
-          <p:spPr>
-            <a:xfrm>
-              <a:off x="6159943" y="2742857"/>
-              <a:ext cx="78035" cy="84529"/>
+            <p:cNvPr id="123" name="tx122"/>
+            <p:cNvSpPr/>
+            <p:nvPr/>
+          </p:nvSpPr>
+          <p:spPr>
+            <a:xfrm>
+              <a:off x="5769343" y="2742857"/>
+              <a:ext cx="484256" cy="84529"/>
             </a:xfrm>
             <a:prstGeom prst="rect">
               <a:avLst/>
@@ -8493,21 +7922,21 @@
                   <a:latin typeface="DejaVu Sans"/>
                   <a:cs typeface="DejaVu Sans"/>
                 </a:rPr>
-                <a:t>C</a:t>
+                <a:t>Trt.ID=C</a:t>
               </a:r>
             </a:p>
           </p:txBody>
         </p:sp>
         <p:sp>
           <p:nvSpPr>
-            <p:cNvPr id="137" name="tx136"/>
-            <p:cNvSpPr/>
-            <p:nvPr/>
-          </p:nvSpPr>
-          <p:spPr>
-            <a:xfrm>
-              <a:off x="6159943" y="2965369"/>
-              <a:ext cx="86057" cy="81473"/>
+            <p:cNvPr id="124" name="tx123"/>
+            <p:cNvSpPr/>
+            <p:nvPr/>
+          </p:nvSpPr>
+          <p:spPr>
+            <a:xfrm>
+              <a:off x="5769343" y="2965369"/>
+              <a:ext cx="492278" cy="81473"/>
             </a:xfrm>
             <a:prstGeom prst="rect">
               <a:avLst/>
@@ -8539,7 +7968,7 @@
                   <a:latin typeface="DejaVu Sans"/>
                   <a:cs typeface="DejaVu Sans"/>
                 </a:rPr>
-                <a:t>D</a:t>
+                <a:t>Trt.ID=D</a:t>
               </a:r>
             </a:p>
           </p:txBody>

</xml_diff>

<commit_message>
Deploying to gh-pages from @ sean4andrew/safuncs@dd294a9a77c9b120849ef771df1e80783f8895a8 🚀
</commit_message>
<xml_diff>
--- a/reference/QCATC777-Survival-Curve.pptx
+++ b/reference/QCATC777-Survival-Curve.pptx
@@ -4827,8 +4827,8 @@
           </p:nvSpPr>
           <p:spPr>
             <a:xfrm>
-              <a:off x="2324759" y="3571704"/>
-              <a:ext cx="670986" cy="107582"/>
+              <a:off x="2608058" y="3571704"/>
+              <a:ext cx="104388" cy="107582"/>
             </a:xfrm>
             <a:prstGeom prst="rect">
               <a:avLst/>
@@ -4860,7 +4860,7 @@
                   <a:latin typeface="DejaVu Sans"/>
                   <a:cs typeface="DejaVu Sans"/>
                 </a:rPr>
-                <a:t>Trt.ID: C</a:t>
+                <a:t>C</a:t>
               </a:r>
             </a:p>
           </p:txBody>
@@ -4908,8 +4908,8 @@
           </p:nvSpPr>
           <p:spPr>
             <a:xfrm>
-              <a:off x="4250653" y="3575593"/>
-              <a:ext cx="684668" cy="103693"/>
+              <a:off x="4533953" y="3575593"/>
+              <a:ext cx="118070" cy="103693"/>
             </a:xfrm>
             <a:prstGeom prst="rect">
               <a:avLst/>
@@ -4941,7 +4941,7 @@
                   <a:latin typeface="DejaVu Sans"/>
                   <a:cs typeface="DejaVu Sans"/>
                 </a:rPr>
-                <a:t>Trt.ID: D</a:t>
+                <a:t>D</a:t>
               </a:r>
             </a:p>
           </p:txBody>
@@ -4989,8 +4989,8 @@
           </p:nvSpPr>
           <p:spPr>
             <a:xfrm>
-              <a:off x="2321912" y="1126573"/>
-              <a:ext cx="676681" cy="103693"/>
+              <a:off x="2605211" y="1126573"/>
+              <a:ext cx="110083" cy="103693"/>
             </a:xfrm>
             <a:prstGeom prst="rect">
               <a:avLst/>
@@ -5022,7 +5022,7 @@
                   <a:latin typeface="DejaVu Sans"/>
                   <a:cs typeface="DejaVu Sans"/>
                 </a:rPr>
-                <a:t>Trt.ID: A</a:t>
+                <a:t>A</a:t>
               </a:r>
             </a:p>
           </p:txBody>
@@ -5070,8 +5070,8 @@
           </p:nvSpPr>
           <p:spPr>
             <a:xfrm>
-              <a:off x="4255480" y="1126573"/>
-              <a:ext cx="675014" cy="103693"/>
+              <a:off x="4538780" y="1126573"/>
+              <a:ext cx="108416" cy="103693"/>
             </a:xfrm>
             <a:prstGeom prst="rect">
               <a:avLst/>
@@ -5103,7 +5103,7 @@
                   <a:latin typeface="DejaVu Sans"/>
                   <a:cs typeface="DejaVu Sans"/>
                 </a:rPr>
-                <a:t>Trt.ID: B</a:t>
+                <a:t>B</a:t>
               </a:r>
             </a:p>
           </p:txBody>

</xml_diff>